<commit_message>
added operation on files
</commit_message>
<xml_diff>
--- a/Python-resume.pptx
+++ b/Python-resume.pptx
@@ -5,7 +5,7 @@
     <p:sldMasterId id="2147483648" r:id="rId1"/>
   </p:sldMasterIdLst>
   <p:notesMasterIdLst>
-    <p:notesMasterId r:id="rId93"/>
+    <p:notesMasterId r:id="rId99"/>
   </p:notesMasterIdLst>
   <p:sldIdLst>
     <p:sldId id="256" r:id="rId2"/>
@@ -99,6 +99,12 @@
     <p:sldId id="382" r:id="rId90"/>
     <p:sldId id="383" r:id="rId91"/>
     <p:sldId id="384" r:id="rId92"/>
+    <p:sldId id="385" r:id="rId93"/>
+    <p:sldId id="386" r:id="rId94"/>
+    <p:sldId id="387" r:id="rId95"/>
+    <p:sldId id="388" r:id="rId96"/>
+    <p:sldId id="389" r:id="rId97"/>
+    <p:sldId id="390" r:id="rId98"/>
   </p:sldIdLst>
   <p:sldSz cx="12192000" cy="6858000"/>
   <p:notesSz cx="6858000" cy="9144000"/>
@@ -55144,6 +55150,2638 @@
 </p:sld>
 </file>
 
+<file path=ppt/slides/slide92.xml><?xml version="1.0" encoding="utf-8"?>
+<p:sld xmlns:a="http://schemas.openxmlformats.org/drawingml/2006/main" xmlns:r="http://schemas.openxmlformats.org/officeDocument/2006/relationships" xmlns:p="http://schemas.openxmlformats.org/presentationml/2006/main">
+  <p:cSld>
+    <p:spTree>
+      <p:nvGrpSpPr>
+        <p:cNvPr id="1" name=""/>
+        <p:cNvGrpSpPr/>
+        <p:nvPr/>
+      </p:nvGrpSpPr>
+      <p:grpSpPr>
+        <a:xfrm>
+          <a:off x="0" y="0"/>
+          <a:ext cx="0" cy="0"/>
+          <a:chOff x="0" y="0"/>
+          <a:chExt cx="0" cy="0"/>
+        </a:xfrm>
+      </p:grpSpPr>
+      <p:sp>
+        <p:nvSpPr>
+          <p:cNvPr id="3" name="Espace réservé du contenu 2">
+            <a:extLst>
+              <a:ext uri="{FF2B5EF4-FFF2-40B4-BE49-F238E27FC236}">
+                <a16:creationId xmlns:a16="http://schemas.microsoft.com/office/drawing/2014/main" id="{26019C14-248F-4937-B7A1-BB6BDCB8ED35}"/>
+              </a:ext>
+            </a:extLst>
+          </p:cNvPr>
+          <p:cNvSpPr>
+            <a:spLocks noGrp="1"/>
+          </p:cNvSpPr>
+          <p:nvPr>
+            <p:ph idx="1"/>
+          </p:nvPr>
+        </p:nvSpPr>
+        <p:spPr>
+          <a:xfrm>
+            <a:off x="1" y="0"/>
+            <a:ext cx="12191999" cy="6857999"/>
+          </a:xfrm>
+          <a:gradFill>
+            <a:gsLst>
+              <a:gs pos="0">
+                <a:schemeClr val="bg2">
+                  <a:lumMod val="90000"/>
+                </a:schemeClr>
+              </a:gs>
+              <a:gs pos="100000">
+                <a:schemeClr val="bg2">
+                  <a:lumMod val="25000"/>
+                </a:schemeClr>
+              </a:gs>
+            </a:gsLst>
+            <a:lin ang="5400000" scaled="1"/>
+          </a:gradFill>
+        </p:spPr>
+        <p:txBody>
+          <a:bodyPr/>
+          <a:lstStyle/>
+          <a:p>
+            <a:pPr marL="0" indent="0">
+              <a:buNone/>
+            </a:pPr>
+            <a:r>
+              <a:rPr lang="fr-FR" dirty="0"/>
+              <a:t>	</a:t>
+            </a:r>
+          </a:p>
+          <a:p>
+            <a:pPr marL="0" indent="0">
+              <a:buNone/>
+            </a:pPr>
+            <a:endParaRPr lang="fr-FR" dirty="0"/>
+          </a:p>
+          <a:p>
+            <a:pPr marL="0" indent="0">
+              <a:buNone/>
+            </a:pPr>
+            <a:endParaRPr lang="fr-FR" dirty="0"/>
+          </a:p>
+          <a:p>
+            <a:pPr marL="0" indent="0">
+              <a:buNone/>
+            </a:pPr>
+            <a:endParaRPr lang="fr-FR" sz="1400" dirty="0"/>
+          </a:p>
+          <a:p>
+            <a:pPr marL="0" indent="0">
+              <a:lnSpc>
+                <a:spcPct val="100000"/>
+              </a:lnSpc>
+              <a:buNone/>
+            </a:pPr>
+            <a:endParaRPr lang="fr-FR" sz="1400" b="1" dirty="0"/>
+          </a:p>
+        </p:txBody>
+      </p:sp>
+      <p:sp>
+        <p:nvSpPr>
+          <p:cNvPr id="2" name="Titre 1">
+            <a:extLst>
+              <a:ext uri="{FF2B5EF4-FFF2-40B4-BE49-F238E27FC236}">
+                <a16:creationId xmlns:a16="http://schemas.microsoft.com/office/drawing/2014/main" id="{C2DDB91C-04E9-41CA-9731-E7D1B6B6D47E}"/>
+              </a:ext>
+            </a:extLst>
+          </p:cNvPr>
+          <p:cNvSpPr>
+            <a:spLocks noGrp="1"/>
+          </p:cNvSpPr>
+          <p:nvPr>
+            <p:ph type="title"/>
+          </p:nvPr>
+        </p:nvSpPr>
+        <p:spPr>
+          <a:xfrm>
+            <a:off x="-266698" y="2766217"/>
+            <a:ext cx="12192000" cy="1325563"/>
+          </a:xfrm>
+        </p:spPr>
+        <p:txBody>
+          <a:bodyPr>
+            <a:noAutofit/>
+          </a:bodyPr>
+          <a:lstStyle/>
+          <a:p>
+            <a:pPr lvl="0" algn="ctr" fontAlgn="base">
+              <a:spcAft>
+                <a:spcPct val="0"/>
+              </a:spcAft>
+            </a:pPr>
+            <a:r>
+              <a:rPr lang="fr-FR" altLang="fr-FR" sz="9600" dirty="0">
+                <a:solidFill>
+                  <a:schemeClr val="accent5">
+                    <a:lumMod val="75000"/>
+                  </a:schemeClr>
+                </a:solidFill>
+              </a:rPr>
+              <a:t>Utiliser des fichiers</a:t>
+            </a:r>
+            <a:endParaRPr lang="fr-FR" altLang="fr-FR" sz="9600" b="1" dirty="0">
+              <a:solidFill>
+                <a:schemeClr val="accent5">
+                  <a:lumMod val="75000"/>
+                </a:schemeClr>
+              </a:solidFill>
+            </a:endParaRPr>
+          </a:p>
+        </p:txBody>
+      </p:sp>
+      <p:sp>
+        <p:nvSpPr>
+          <p:cNvPr id="4" name="ZoneTexte 3">
+            <a:extLst>
+              <a:ext uri="{FF2B5EF4-FFF2-40B4-BE49-F238E27FC236}">
+                <a16:creationId xmlns:a16="http://schemas.microsoft.com/office/drawing/2014/main" id="{318E8B91-EB38-4F32-897B-41BFDFA2D26D}"/>
+              </a:ext>
+            </a:extLst>
+          </p:cNvPr>
+          <p:cNvSpPr txBox="1"/>
+          <p:nvPr/>
+        </p:nvSpPr>
+        <p:spPr>
+          <a:xfrm>
+            <a:off x="209554" y="12012972"/>
+            <a:ext cx="11715748" cy="914400"/>
+          </a:xfrm>
+          <a:prstGeom prst="rect">
+            <a:avLst/>
+          </a:prstGeom>
+          <a:noFill/>
+        </p:spPr>
+        <p:txBody>
+          <a:bodyPr wrap="square" rtlCol="0">
+            <a:spAutoFit/>
+          </a:bodyPr>
+          <a:lstStyle/>
+          <a:p>
+            <a:endParaRPr lang="fr-FR" dirty="0"/>
+          </a:p>
+        </p:txBody>
+      </p:sp>
+    </p:spTree>
+    <p:extLst>
+      <p:ext uri="{BB962C8B-B14F-4D97-AF65-F5344CB8AC3E}">
+        <p14:creationId xmlns:p14="http://schemas.microsoft.com/office/powerpoint/2010/main" val="3223129813"/>
+      </p:ext>
+    </p:extLst>
+  </p:cSld>
+  <p:clrMapOvr>
+    <a:masterClrMapping/>
+  </p:clrMapOvr>
+</p:sld>
+</file>
+
+<file path=ppt/slides/slide93.xml><?xml version="1.0" encoding="utf-8"?>
+<p:sld xmlns:a="http://schemas.openxmlformats.org/drawingml/2006/main" xmlns:r="http://schemas.openxmlformats.org/officeDocument/2006/relationships" xmlns:p="http://schemas.openxmlformats.org/presentationml/2006/main">
+  <p:cSld>
+    <p:spTree>
+      <p:nvGrpSpPr>
+        <p:cNvPr id="1" name=""/>
+        <p:cNvGrpSpPr/>
+        <p:nvPr/>
+      </p:nvGrpSpPr>
+      <p:grpSpPr>
+        <a:xfrm>
+          <a:off x="0" y="0"/>
+          <a:ext cx="0" cy="0"/>
+          <a:chOff x="0" y="0"/>
+          <a:chExt cx="0" cy="0"/>
+        </a:xfrm>
+      </p:grpSpPr>
+      <p:sp>
+        <p:nvSpPr>
+          <p:cNvPr id="3" name="Espace réservé du contenu 2">
+            <a:extLst>
+              <a:ext uri="{FF2B5EF4-FFF2-40B4-BE49-F238E27FC236}">
+                <a16:creationId xmlns:a16="http://schemas.microsoft.com/office/drawing/2014/main" id="{26019C14-248F-4937-B7A1-BB6BDCB8ED35}"/>
+              </a:ext>
+            </a:extLst>
+          </p:cNvPr>
+          <p:cNvSpPr>
+            <a:spLocks noGrp="1"/>
+          </p:cNvSpPr>
+          <p:nvPr>
+            <p:ph idx="1"/>
+          </p:nvPr>
+        </p:nvSpPr>
+        <p:spPr>
+          <a:xfrm>
+            <a:off x="1" y="0"/>
+            <a:ext cx="12191999" cy="6857999"/>
+          </a:xfrm>
+          <a:gradFill>
+            <a:gsLst>
+              <a:gs pos="0">
+                <a:schemeClr val="bg2">
+                  <a:lumMod val="90000"/>
+                </a:schemeClr>
+              </a:gs>
+              <a:gs pos="100000">
+                <a:schemeClr val="bg2">
+                  <a:lumMod val="25000"/>
+                </a:schemeClr>
+              </a:gs>
+            </a:gsLst>
+            <a:lin ang="5400000" scaled="1"/>
+          </a:gradFill>
+        </p:spPr>
+        <p:txBody>
+          <a:bodyPr/>
+          <a:lstStyle/>
+          <a:p>
+            <a:pPr marL="0" indent="0">
+              <a:buNone/>
+            </a:pPr>
+            <a:r>
+              <a:rPr lang="fr-FR" dirty="0"/>
+              <a:t>	</a:t>
+            </a:r>
+          </a:p>
+          <a:p>
+            <a:pPr marL="0" indent="0">
+              <a:buNone/>
+            </a:pPr>
+            <a:endParaRPr lang="fr-FR" dirty="0"/>
+          </a:p>
+          <a:p>
+            <a:pPr marL="0" indent="0">
+              <a:buNone/>
+            </a:pPr>
+            <a:endParaRPr lang="fr-FR" dirty="0"/>
+          </a:p>
+          <a:p>
+            <a:pPr marL="0" indent="0">
+              <a:buNone/>
+            </a:pPr>
+            <a:endParaRPr lang="fr-FR" sz="1400" dirty="0"/>
+          </a:p>
+          <a:p>
+            <a:pPr marL="0" indent="0">
+              <a:lnSpc>
+                <a:spcPct val="100000"/>
+              </a:lnSpc>
+              <a:buNone/>
+            </a:pPr>
+            <a:endParaRPr lang="fr-FR" sz="1400" b="1" dirty="0"/>
+          </a:p>
+        </p:txBody>
+      </p:sp>
+      <p:sp>
+        <p:nvSpPr>
+          <p:cNvPr id="2" name="Titre 1">
+            <a:extLst>
+              <a:ext uri="{FF2B5EF4-FFF2-40B4-BE49-F238E27FC236}">
+                <a16:creationId xmlns:a16="http://schemas.microsoft.com/office/drawing/2014/main" id="{C2DDB91C-04E9-41CA-9731-E7D1B6B6D47E}"/>
+              </a:ext>
+            </a:extLst>
+          </p:cNvPr>
+          <p:cNvSpPr>
+            <a:spLocks noGrp="1"/>
+          </p:cNvSpPr>
+          <p:nvPr>
+            <p:ph type="title"/>
+          </p:nvPr>
+        </p:nvSpPr>
+        <p:spPr>
+          <a:xfrm>
+            <a:off x="-266698" y="0"/>
+            <a:ext cx="12192000" cy="1325563"/>
+          </a:xfrm>
+        </p:spPr>
+        <p:txBody>
+          <a:bodyPr>
+            <a:noAutofit/>
+          </a:bodyPr>
+          <a:lstStyle/>
+          <a:p>
+            <a:pPr lvl="0" algn="ctr" fontAlgn="base">
+              <a:spcAft>
+                <a:spcPct val="0"/>
+              </a:spcAft>
+            </a:pPr>
+            <a:r>
+              <a:rPr lang="fr-FR" altLang="fr-FR" sz="6000" dirty="0">
+                <a:solidFill>
+                  <a:schemeClr val="accent5">
+                    <a:lumMod val="75000"/>
+                  </a:schemeClr>
+                </a:solidFill>
+              </a:rPr>
+              <a:t>Utiliser des fichiers 1</a:t>
+            </a:r>
+            <a:endParaRPr lang="fr-FR" altLang="fr-FR" sz="6000" b="1" dirty="0">
+              <a:solidFill>
+                <a:schemeClr val="accent5">
+                  <a:lumMod val="75000"/>
+                </a:schemeClr>
+              </a:solidFill>
+            </a:endParaRPr>
+          </a:p>
+        </p:txBody>
+      </p:sp>
+      <p:sp>
+        <p:nvSpPr>
+          <p:cNvPr id="4" name="ZoneTexte 3">
+            <a:extLst>
+              <a:ext uri="{FF2B5EF4-FFF2-40B4-BE49-F238E27FC236}">
+                <a16:creationId xmlns:a16="http://schemas.microsoft.com/office/drawing/2014/main" id="{318E8B91-EB38-4F32-897B-41BFDFA2D26D}"/>
+              </a:ext>
+            </a:extLst>
+          </p:cNvPr>
+          <p:cNvSpPr txBox="1"/>
+          <p:nvPr/>
+        </p:nvSpPr>
+        <p:spPr>
+          <a:xfrm>
+            <a:off x="209554" y="12012972"/>
+            <a:ext cx="11715748" cy="914400"/>
+          </a:xfrm>
+          <a:prstGeom prst="rect">
+            <a:avLst/>
+          </a:prstGeom>
+          <a:noFill/>
+        </p:spPr>
+        <p:txBody>
+          <a:bodyPr wrap="square" rtlCol="0">
+            <a:spAutoFit/>
+          </a:bodyPr>
+          <a:lstStyle/>
+          <a:p>
+            <a:endParaRPr lang="fr-FR" dirty="0"/>
+          </a:p>
+        </p:txBody>
+      </p:sp>
+      <p:sp>
+        <p:nvSpPr>
+          <p:cNvPr id="5" name="ZoneTexte 4">
+            <a:extLst>
+              <a:ext uri="{FF2B5EF4-FFF2-40B4-BE49-F238E27FC236}">
+                <a16:creationId xmlns:a16="http://schemas.microsoft.com/office/drawing/2014/main" id="{5ED24F53-74E8-4CB8-AE4D-1EC67A8AAC6F}"/>
+              </a:ext>
+            </a:extLst>
+          </p:cNvPr>
+          <p:cNvSpPr txBox="1"/>
+          <p:nvPr/>
+        </p:nvSpPr>
+        <p:spPr>
+          <a:xfrm>
+            <a:off x="209554" y="1252537"/>
+            <a:ext cx="6062663" cy="369332"/>
+          </a:xfrm>
+          <a:prstGeom prst="rect">
+            <a:avLst/>
+          </a:prstGeom>
+          <a:noFill/>
+        </p:spPr>
+        <p:txBody>
+          <a:bodyPr wrap="square" rtlCol="0">
+            <a:spAutoFit/>
+          </a:bodyPr>
+          <a:lstStyle/>
+          <a:p>
+            <a:r>
+              <a:rPr lang="fr-FR" dirty="0"/>
+              <a:t>Changer de répertoire</a:t>
+            </a:r>
+          </a:p>
+        </p:txBody>
+      </p:sp>
+      <p:sp>
+        <p:nvSpPr>
+          <p:cNvPr id="6" name="ZoneTexte 5">
+            <a:extLst>
+              <a:ext uri="{FF2B5EF4-FFF2-40B4-BE49-F238E27FC236}">
+                <a16:creationId xmlns:a16="http://schemas.microsoft.com/office/drawing/2014/main" id="{10C77C71-0A30-43E5-960B-4E7F441401F7}"/>
+              </a:ext>
+            </a:extLst>
+          </p:cNvPr>
+          <p:cNvSpPr txBox="1"/>
+          <p:nvPr/>
+        </p:nvSpPr>
+        <p:spPr>
+          <a:xfrm>
+            <a:off x="209554" y="1621869"/>
+            <a:ext cx="6062663" cy="646331"/>
+          </a:xfrm>
+          <a:prstGeom prst="rect">
+            <a:avLst/>
+          </a:prstGeom>
+          <a:solidFill>
+            <a:schemeClr val="tx1"/>
+          </a:solidFill>
+        </p:spPr>
+        <p:txBody>
+          <a:bodyPr wrap="square" rtlCol="0">
+            <a:spAutoFit/>
+          </a:bodyPr>
+          <a:lstStyle/>
+          <a:p>
+            <a:r>
+              <a:rPr lang="fr-FR" dirty="0">
+                <a:solidFill>
+                  <a:schemeClr val="bg1"/>
+                </a:solidFill>
+              </a:rPr>
+              <a:t>import os</a:t>
+            </a:r>
+          </a:p>
+          <a:p>
+            <a:r>
+              <a:rPr lang="fr-FR" dirty="0" err="1">
+                <a:solidFill>
+                  <a:schemeClr val="bg1"/>
+                </a:solidFill>
+              </a:rPr>
+              <a:t>os.chdir</a:t>
+            </a:r>
+            <a:r>
+              <a:rPr lang="fr-FR" dirty="0">
+                <a:solidFill>
+                  <a:schemeClr val="bg1"/>
+                </a:solidFill>
+              </a:rPr>
+              <a:t>(‘’C:/tests python’’)v</a:t>
+            </a:r>
+          </a:p>
+        </p:txBody>
+      </p:sp>
+      <p:sp>
+        <p:nvSpPr>
+          <p:cNvPr id="7" name="ZoneTexte 6">
+            <a:extLst>
+              <a:ext uri="{FF2B5EF4-FFF2-40B4-BE49-F238E27FC236}">
+                <a16:creationId xmlns:a16="http://schemas.microsoft.com/office/drawing/2014/main" id="{FD673AD2-4C80-4301-8627-1C141A27A25C}"/>
+              </a:ext>
+            </a:extLst>
+          </p:cNvPr>
+          <p:cNvSpPr txBox="1"/>
+          <p:nvPr/>
+        </p:nvSpPr>
+        <p:spPr>
+          <a:xfrm>
+            <a:off x="209554" y="2927044"/>
+            <a:ext cx="6062663" cy="646331"/>
+          </a:xfrm>
+          <a:prstGeom prst="rect">
+            <a:avLst/>
+          </a:prstGeom>
+          <a:solidFill>
+            <a:schemeClr val="tx1"/>
+          </a:solidFill>
+        </p:spPr>
+        <p:txBody>
+          <a:bodyPr wrap="square" rtlCol="0">
+            <a:spAutoFit/>
+          </a:bodyPr>
+          <a:lstStyle/>
+          <a:p>
+            <a:r>
+              <a:rPr lang="fr-FR" dirty="0">
+                <a:solidFill>
+                  <a:schemeClr val="bg1"/>
+                </a:solidFill>
+              </a:rPr>
+              <a:t>with open(mon_fichier, mode_ouverture) as variable:</a:t>
+            </a:r>
+          </a:p>
+          <a:p>
+            <a:r>
+              <a:rPr lang="fr-FR" dirty="0">
+                <a:solidFill>
+                  <a:schemeClr val="bg1"/>
+                </a:solidFill>
+              </a:rPr>
+              <a:t>    # Opérations sur le fichier</a:t>
+            </a:r>
+          </a:p>
+        </p:txBody>
+      </p:sp>
+      <p:sp>
+        <p:nvSpPr>
+          <p:cNvPr id="8" name="ZoneTexte 7">
+            <a:extLst>
+              <a:ext uri="{FF2B5EF4-FFF2-40B4-BE49-F238E27FC236}">
+                <a16:creationId xmlns:a16="http://schemas.microsoft.com/office/drawing/2014/main" id="{F553A210-C8A2-4DD4-844F-FD07FA6C6E24}"/>
+              </a:ext>
+            </a:extLst>
+          </p:cNvPr>
+          <p:cNvSpPr txBox="1"/>
+          <p:nvPr/>
+        </p:nvSpPr>
+        <p:spPr>
+          <a:xfrm>
+            <a:off x="209553" y="2505074"/>
+            <a:ext cx="6062663" cy="369332"/>
+          </a:xfrm>
+          <a:prstGeom prst="rect">
+            <a:avLst/>
+          </a:prstGeom>
+          <a:noFill/>
+        </p:spPr>
+        <p:txBody>
+          <a:bodyPr wrap="square" rtlCol="0">
+            <a:spAutoFit/>
+          </a:bodyPr>
+          <a:lstStyle/>
+          <a:p>
+            <a:r>
+              <a:rPr lang="fr-FR" dirty="0"/>
+              <a:t>Ouverture d’un fichier</a:t>
+            </a:r>
+          </a:p>
+        </p:txBody>
+      </p:sp>
+      <p:sp>
+        <p:nvSpPr>
+          <p:cNvPr id="10" name="ZoneTexte 9">
+            <a:extLst>
+              <a:ext uri="{FF2B5EF4-FFF2-40B4-BE49-F238E27FC236}">
+                <a16:creationId xmlns:a16="http://schemas.microsoft.com/office/drawing/2014/main" id="{4EB9D804-4C14-4008-AA63-6BAAFAA912AF}"/>
+              </a:ext>
+            </a:extLst>
+          </p:cNvPr>
+          <p:cNvSpPr txBox="1"/>
+          <p:nvPr/>
+        </p:nvSpPr>
+        <p:spPr>
+          <a:xfrm>
+            <a:off x="209553" y="3972895"/>
+            <a:ext cx="6062663" cy="646331"/>
+          </a:xfrm>
+          <a:prstGeom prst="rect">
+            <a:avLst/>
+          </a:prstGeom>
+          <a:solidFill>
+            <a:schemeClr val="tx1"/>
+          </a:solidFill>
+        </p:spPr>
+        <p:txBody>
+          <a:bodyPr wrap="square" rtlCol="0">
+            <a:spAutoFit/>
+          </a:bodyPr>
+          <a:lstStyle/>
+          <a:p>
+            <a:r>
+              <a:rPr lang="fr-FR" dirty="0">
+                <a:solidFill>
+                  <a:schemeClr val="bg1"/>
+                </a:solidFill>
+              </a:rPr>
+              <a:t>with open('fichier.txt', 'r') as mon_fichier:</a:t>
+            </a:r>
+          </a:p>
+          <a:p>
+            <a:r>
+              <a:rPr lang="fr-FR" dirty="0">
+                <a:solidFill>
+                  <a:schemeClr val="bg1"/>
+                </a:solidFill>
+              </a:rPr>
+              <a:t>...     texte = mon_fichier.read()</a:t>
+            </a:r>
+          </a:p>
+        </p:txBody>
+      </p:sp>
+      <p:sp>
+        <p:nvSpPr>
+          <p:cNvPr id="14" name="Rectangle 1">
+            <a:extLst>
+              <a:ext uri="{FF2B5EF4-FFF2-40B4-BE49-F238E27FC236}">
+                <a16:creationId xmlns:a16="http://schemas.microsoft.com/office/drawing/2014/main" id="{BB83FD6F-9F16-4756-BFAA-C80D3149CA31}"/>
+              </a:ext>
+            </a:extLst>
+          </p:cNvPr>
+          <p:cNvSpPr>
+            <a:spLocks noChangeArrowheads="1"/>
+          </p:cNvSpPr>
+          <p:nvPr/>
+        </p:nvSpPr>
+        <p:spPr bwMode="auto">
+          <a:xfrm>
+            <a:off x="85730" y="4695580"/>
+            <a:ext cx="12372972" cy="646331"/>
+          </a:xfrm>
+          <a:prstGeom prst="rect">
+            <a:avLst/>
+          </a:prstGeom>
+          <a:noFill/>
+          <a:ln>
+            <a:noFill/>
+          </a:ln>
+          <a:effectLst/>
+          <a:extLst>
+            <a:ext uri="{909E8E84-426E-40DD-AFC4-6F175D3DCCD1}">
+              <a14:hiddenFill xmlns:a14="http://schemas.microsoft.com/office/drawing/2010/main">
+                <a:solidFill>
+                  <a:schemeClr val="accent1"/>
+                </a:solidFill>
+              </a14:hiddenFill>
+            </a:ext>
+            <a:ext uri="{91240B29-F687-4F45-9708-019B960494DF}">
+              <a14:hiddenLine xmlns:a14="http://schemas.microsoft.com/office/drawing/2010/main" w="9525">
+                <a:solidFill>
+                  <a:schemeClr val="tx1"/>
+                </a:solidFill>
+                <a:miter lim="800000"/>
+                <a:headEnd/>
+                <a:tailEnd/>
+              </a14:hiddenLine>
+            </a:ext>
+            <a:ext uri="{AF507438-7753-43E0-B8FC-AC1667EBCBE1}">
+              <a14:hiddenEffects xmlns:a14="http://schemas.microsoft.com/office/drawing/2010/main">
+                <a:effectLst>
+                  <a:outerShdw dist="35921" dir="2700000" algn="ctr" rotWithShape="0">
+                    <a:schemeClr val="bg2"/>
+                  </a:outerShdw>
+                </a:effectLst>
+              </a14:hiddenEffects>
+            </a:ext>
+          </a:extLst>
+        </p:spPr>
+        <p:txBody>
+          <a:bodyPr vert="horz" wrap="square" lIns="91440" tIns="45720" rIns="91440" bIns="45720" numCol="1" anchor="ctr" anchorCtr="0" compatLnSpc="1">
+            <a:prstTxWarp prst="textNoShape">
+              <a:avLst/>
+            </a:prstTxWarp>
+            <a:spAutoFit/>
+          </a:bodyPr>
+          <a:lstStyle/>
+          <a:p>
+            <a:pPr marL="0" marR="0" lvl="0" indent="0" algn="l" defTabSz="914400" rtl="0" eaLnBrk="0" fontAlgn="base" latinLnBrk="0" hangingPunct="0">
+              <a:lnSpc>
+                <a:spcPct val="100000"/>
+              </a:lnSpc>
+              <a:spcBef>
+                <a:spcPct val="0"/>
+              </a:spcBef>
+              <a:spcAft>
+                <a:spcPct val="0"/>
+              </a:spcAft>
+              <a:buClrTx/>
+              <a:buSzTx/>
+              <a:buFontTx/>
+              <a:buNone/>
+              <a:tabLst/>
+            </a:pPr>
+            <a:r>
+              <a:rPr lang="fr-FR" altLang="fr-FR" dirty="0"/>
+              <a:t>Le mot-clé with permet de créer un "</a:t>
+            </a:r>
+            <a:r>
+              <a:rPr lang="fr-FR" altLang="fr-FR" dirty="0" err="1"/>
+              <a:t>context</a:t>
+            </a:r>
+            <a:r>
+              <a:rPr lang="fr-FR" altLang="fr-FR" dirty="0"/>
+              <a:t> manager" (gestionnaire de contexte) qui vérifie que le fichier est ouvert et fermé, même si des erreurs se produisent pendant le bloc. Vous verrez plus loin d'autres objets utilisant le même mécanisme. </a:t>
+            </a:r>
+          </a:p>
+        </p:txBody>
+      </p:sp>
+    </p:spTree>
+    <p:extLst>
+      <p:ext uri="{BB962C8B-B14F-4D97-AF65-F5344CB8AC3E}">
+        <p14:creationId xmlns:p14="http://schemas.microsoft.com/office/powerpoint/2010/main" val="389432116"/>
+      </p:ext>
+    </p:extLst>
+  </p:cSld>
+  <p:clrMapOvr>
+    <a:masterClrMapping/>
+  </p:clrMapOvr>
+</p:sld>
+</file>
+
+<file path=ppt/slides/slide94.xml><?xml version="1.0" encoding="utf-8"?>
+<p:sld xmlns:a="http://schemas.openxmlformats.org/drawingml/2006/main" xmlns:r="http://schemas.openxmlformats.org/officeDocument/2006/relationships" xmlns:p="http://schemas.openxmlformats.org/presentationml/2006/main">
+  <p:cSld>
+    <p:spTree>
+      <p:nvGrpSpPr>
+        <p:cNvPr id="1" name=""/>
+        <p:cNvGrpSpPr/>
+        <p:nvPr/>
+      </p:nvGrpSpPr>
+      <p:grpSpPr>
+        <a:xfrm>
+          <a:off x="0" y="0"/>
+          <a:ext cx="0" cy="0"/>
+          <a:chOff x="0" y="0"/>
+          <a:chExt cx="0" cy="0"/>
+        </a:xfrm>
+      </p:grpSpPr>
+      <p:sp>
+        <p:nvSpPr>
+          <p:cNvPr id="3" name="Espace réservé du contenu 2">
+            <a:extLst>
+              <a:ext uri="{FF2B5EF4-FFF2-40B4-BE49-F238E27FC236}">
+                <a16:creationId xmlns:a16="http://schemas.microsoft.com/office/drawing/2014/main" id="{26019C14-248F-4937-B7A1-BB6BDCB8ED35}"/>
+              </a:ext>
+            </a:extLst>
+          </p:cNvPr>
+          <p:cNvSpPr>
+            <a:spLocks noGrp="1"/>
+          </p:cNvSpPr>
+          <p:nvPr>
+            <p:ph idx="1"/>
+          </p:nvPr>
+        </p:nvSpPr>
+        <p:spPr>
+          <a:xfrm>
+            <a:off x="1" y="0"/>
+            <a:ext cx="12191999" cy="6857999"/>
+          </a:xfrm>
+          <a:gradFill>
+            <a:gsLst>
+              <a:gs pos="0">
+                <a:schemeClr val="bg2">
+                  <a:lumMod val="90000"/>
+                </a:schemeClr>
+              </a:gs>
+              <a:gs pos="100000">
+                <a:schemeClr val="bg2">
+                  <a:lumMod val="25000"/>
+                </a:schemeClr>
+              </a:gs>
+            </a:gsLst>
+            <a:lin ang="5400000" scaled="1"/>
+          </a:gradFill>
+        </p:spPr>
+        <p:txBody>
+          <a:bodyPr/>
+          <a:lstStyle/>
+          <a:p>
+            <a:pPr marL="0" indent="0">
+              <a:buNone/>
+            </a:pPr>
+            <a:r>
+              <a:rPr lang="fr-FR" dirty="0"/>
+              <a:t>	</a:t>
+            </a:r>
+          </a:p>
+          <a:p>
+            <a:pPr marL="0" indent="0">
+              <a:buNone/>
+            </a:pPr>
+            <a:endParaRPr lang="fr-FR" dirty="0"/>
+          </a:p>
+          <a:p>
+            <a:pPr marL="0" indent="0">
+              <a:buNone/>
+            </a:pPr>
+            <a:endParaRPr lang="fr-FR" dirty="0"/>
+          </a:p>
+          <a:p>
+            <a:pPr marL="0" indent="0">
+              <a:buNone/>
+            </a:pPr>
+            <a:endParaRPr lang="fr-FR" sz="1400" dirty="0"/>
+          </a:p>
+          <a:p>
+            <a:pPr marL="0" indent="0">
+              <a:lnSpc>
+                <a:spcPct val="100000"/>
+              </a:lnSpc>
+              <a:buNone/>
+            </a:pPr>
+            <a:endParaRPr lang="fr-FR" sz="1400" b="1" dirty="0"/>
+          </a:p>
+        </p:txBody>
+      </p:sp>
+      <p:sp>
+        <p:nvSpPr>
+          <p:cNvPr id="2" name="Titre 1">
+            <a:extLst>
+              <a:ext uri="{FF2B5EF4-FFF2-40B4-BE49-F238E27FC236}">
+                <a16:creationId xmlns:a16="http://schemas.microsoft.com/office/drawing/2014/main" id="{C2DDB91C-04E9-41CA-9731-E7D1B6B6D47E}"/>
+              </a:ext>
+            </a:extLst>
+          </p:cNvPr>
+          <p:cNvSpPr>
+            <a:spLocks noGrp="1"/>
+          </p:cNvSpPr>
+          <p:nvPr>
+            <p:ph type="title"/>
+          </p:nvPr>
+        </p:nvSpPr>
+        <p:spPr>
+          <a:xfrm>
+            <a:off x="-266698" y="0"/>
+            <a:ext cx="12192000" cy="1325563"/>
+          </a:xfrm>
+        </p:spPr>
+        <p:txBody>
+          <a:bodyPr>
+            <a:noAutofit/>
+          </a:bodyPr>
+          <a:lstStyle/>
+          <a:p>
+            <a:pPr lvl="0" algn="ctr" fontAlgn="base">
+              <a:spcAft>
+                <a:spcPct val="0"/>
+              </a:spcAft>
+            </a:pPr>
+            <a:r>
+              <a:rPr lang="fr-FR" altLang="fr-FR" sz="6000" dirty="0">
+                <a:solidFill>
+                  <a:schemeClr val="accent5">
+                    <a:lumMod val="75000"/>
+                  </a:schemeClr>
+                </a:solidFill>
+              </a:rPr>
+              <a:t>Utiliser des fichiers 2</a:t>
+            </a:r>
+            <a:endParaRPr lang="fr-FR" altLang="fr-FR" sz="6000" b="1" dirty="0">
+              <a:solidFill>
+                <a:schemeClr val="accent5">
+                  <a:lumMod val="75000"/>
+                </a:schemeClr>
+              </a:solidFill>
+            </a:endParaRPr>
+          </a:p>
+        </p:txBody>
+      </p:sp>
+      <p:sp>
+        <p:nvSpPr>
+          <p:cNvPr id="4" name="ZoneTexte 3">
+            <a:extLst>
+              <a:ext uri="{FF2B5EF4-FFF2-40B4-BE49-F238E27FC236}">
+                <a16:creationId xmlns:a16="http://schemas.microsoft.com/office/drawing/2014/main" id="{318E8B91-EB38-4F32-897B-41BFDFA2D26D}"/>
+              </a:ext>
+            </a:extLst>
+          </p:cNvPr>
+          <p:cNvSpPr txBox="1"/>
+          <p:nvPr/>
+        </p:nvSpPr>
+        <p:spPr>
+          <a:xfrm>
+            <a:off x="209554" y="12012972"/>
+            <a:ext cx="11715748" cy="914400"/>
+          </a:xfrm>
+          <a:prstGeom prst="rect">
+            <a:avLst/>
+          </a:prstGeom>
+          <a:noFill/>
+        </p:spPr>
+        <p:txBody>
+          <a:bodyPr wrap="square" rtlCol="0">
+            <a:spAutoFit/>
+          </a:bodyPr>
+          <a:lstStyle/>
+          <a:p>
+            <a:endParaRPr lang="fr-FR" dirty="0"/>
+          </a:p>
+        </p:txBody>
+      </p:sp>
+      <p:sp>
+        <p:nvSpPr>
+          <p:cNvPr id="5" name="ZoneTexte 4">
+            <a:extLst>
+              <a:ext uri="{FF2B5EF4-FFF2-40B4-BE49-F238E27FC236}">
+                <a16:creationId xmlns:a16="http://schemas.microsoft.com/office/drawing/2014/main" id="{5ED24F53-74E8-4CB8-AE4D-1EC67A8AAC6F}"/>
+              </a:ext>
+            </a:extLst>
+          </p:cNvPr>
+          <p:cNvSpPr txBox="1"/>
+          <p:nvPr/>
+        </p:nvSpPr>
+        <p:spPr>
+          <a:xfrm>
+            <a:off x="209554" y="1252537"/>
+            <a:ext cx="6062663" cy="369332"/>
+          </a:xfrm>
+          <a:prstGeom prst="rect">
+            <a:avLst/>
+          </a:prstGeom>
+          <a:noFill/>
+        </p:spPr>
+        <p:txBody>
+          <a:bodyPr wrap="square" rtlCol="0">
+            <a:spAutoFit/>
+          </a:bodyPr>
+          <a:lstStyle/>
+          <a:p>
+            <a:r>
+              <a:rPr lang="fr-FR" dirty="0"/>
+              <a:t>Enregistrer des objets dans des fichiers</a:t>
+            </a:r>
+          </a:p>
+        </p:txBody>
+      </p:sp>
+      <p:sp>
+        <p:nvSpPr>
+          <p:cNvPr id="6" name="ZoneTexte 5">
+            <a:extLst>
+              <a:ext uri="{FF2B5EF4-FFF2-40B4-BE49-F238E27FC236}">
+                <a16:creationId xmlns:a16="http://schemas.microsoft.com/office/drawing/2014/main" id="{10C77C71-0A30-43E5-960B-4E7F441401F7}"/>
+              </a:ext>
+            </a:extLst>
+          </p:cNvPr>
+          <p:cNvSpPr txBox="1"/>
+          <p:nvPr/>
+        </p:nvSpPr>
+        <p:spPr>
+          <a:xfrm>
+            <a:off x="209554" y="1621869"/>
+            <a:ext cx="6062663" cy="369332"/>
+          </a:xfrm>
+          <a:prstGeom prst="rect">
+            <a:avLst/>
+          </a:prstGeom>
+          <a:solidFill>
+            <a:schemeClr val="tx1"/>
+          </a:solidFill>
+        </p:spPr>
+        <p:txBody>
+          <a:bodyPr wrap="square" rtlCol="0">
+            <a:spAutoFit/>
+          </a:bodyPr>
+          <a:lstStyle/>
+          <a:p>
+            <a:r>
+              <a:rPr lang="fr-FR" dirty="0">
+                <a:solidFill>
+                  <a:schemeClr val="bg1"/>
+                </a:solidFill>
+              </a:rPr>
+              <a:t>&gt;&gt;&gt; import pickle</a:t>
+            </a:r>
+          </a:p>
+        </p:txBody>
+      </p:sp>
+      <p:sp>
+        <p:nvSpPr>
+          <p:cNvPr id="7" name="ZoneTexte 6">
+            <a:extLst>
+              <a:ext uri="{FF2B5EF4-FFF2-40B4-BE49-F238E27FC236}">
+                <a16:creationId xmlns:a16="http://schemas.microsoft.com/office/drawing/2014/main" id="{FD673AD2-4C80-4301-8627-1C141A27A25C}"/>
+              </a:ext>
+            </a:extLst>
+          </p:cNvPr>
+          <p:cNvSpPr txBox="1"/>
+          <p:nvPr/>
+        </p:nvSpPr>
+        <p:spPr>
+          <a:xfrm>
+            <a:off x="209554" y="2927044"/>
+            <a:ext cx="6062663" cy="923330"/>
+          </a:xfrm>
+          <a:prstGeom prst="rect">
+            <a:avLst/>
+          </a:prstGeom>
+          <a:solidFill>
+            <a:schemeClr val="tx1"/>
+          </a:solidFill>
+        </p:spPr>
+        <p:txBody>
+          <a:bodyPr wrap="square" rtlCol="0">
+            <a:spAutoFit/>
+          </a:bodyPr>
+          <a:lstStyle/>
+          <a:p>
+            <a:r>
+              <a:rPr lang="en-US" dirty="0">
+                <a:solidFill>
+                  <a:schemeClr val="bg1"/>
+                </a:solidFill>
+              </a:rPr>
+              <a:t>&gt;&gt;&gt; with open('</a:t>
+            </a:r>
+            <a:r>
+              <a:rPr lang="en-US" dirty="0" err="1">
+                <a:solidFill>
+                  <a:schemeClr val="bg1"/>
+                </a:solidFill>
+              </a:rPr>
+              <a:t>donnees</a:t>
+            </a:r>
+            <a:r>
+              <a:rPr lang="en-US" dirty="0">
+                <a:solidFill>
+                  <a:schemeClr val="bg1"/>
+                </a:solidFill>
+              </a:rPr>
+              <a:t>', '</a:t>
+            </a:r>
+            <a:r>
+              <a:rPr lang="en-US" dirty="0" err="1">
+                <a:solidFill>
+                  <a:schemeClr val="bg1"/>
+                </a:solidFill>
+              </a:rPr>
+              <a:t>wb</a:t>
+            </a:r>
+            <a:r>
+              <a:rPr lang="en-US" dirty="0">
+                <a:solidFill>
+                  <a:schemeClr val="bg1"/>
+                </a:solidFill>
+              </a:rPr>
+              <a:t>') as </a:t>
+            </a:r>
+            <a:r>
+              <a:rPr lang="en-US" dirty="0" err="1">
+                <a:solidFill>
+                  <a:schemeClr val="bg1"/>
+                </a:solidFill>
+              </a:rPr>
+              <a:t>fichier</a:t>
+            </a:r>
+            <a:r>
+              <a:rPr lang="en-US" dirty="0">
+                <a:solidFill>
+                  <a:schemeClr val="bg1"/>
+                </a:solidFill>
+              </a:rPr>
+              <a:t>:</a:t>
+            </a:r>
+          </a:p>
+          <a:p>
+            <a:r>
+              <a:rPr lang="en-US" dirty="0">
+                <a:solidFill>
+                  <a:schemeClr val="bg1"/>
+                </a:solidFill>
+              </a:rPr>
+              <a:t>...     </a:t>
+            </a:r>
+            <a:r>
+              <a:rPr lang="en-US" dirty="0" err="1">
+                <a:solidFill>
+                  <a:schemeClr val="bg1"/>
+                </a:solidFill>
+              </a:rPr>
+              <a:t>mon_pickler</a:t>
+            </a:r>
+            <a:r>
+              <a:rPr lang="en-US" dirty="0">
+                <a:solidFill>
+                  <a:schemeClr val="bg1"/>
+                </a:solidFill>
+              </a:rPr>
+              <a:t> = </a:t>
+            </a:r>
+            <a:r>
+              <a:rPr lang="en-US" dirty="0" err="1">
+                <a:solidFill>
+                  <a:schemeClr val="bg1"/>
+                </a:solidFill>
+              </a:rPr>
+              <a:t>pickle.Pickler</a:t>
+            </a:r>
+            <a:r>
+              <a:rPr lang="en-US" dirty="0">
+                <a:solidFill>
+                  <a:schemeClr val="bg1"/>
+                </a:solidFill>
+              </a:rPr>
+              <a:t>(</a:t>
+            </a:r>
+            <a:r>
+              <a:rPr lang="en-US" dirty="0" err="1">
+                <a:solidFill>
+                  <a:schemeClr val="bg1"/>
+                </a:solidFill>
+              </a:rPr>
+              <a:t>fichier</a:t>
+            </a:r>
+            <a:r>
+              <a:rPr lang="en-US" dirty="0">
+                <a:solidFill>
+                  <a:schemeClr val="bg1"/>
+                </a:solidFill>
+              </a:rPr>
+              <a:t>)</a:t>
+            </a:r>
+          </a:p>
+          <a:p>
+            <a:r>
+              <a:rPr lang="en-US" dirty="0">
+                <a:solidFill>
+                  <a:schemeClr val="bg1"/>
+                </a:solidFill>
+              </a:rPr>
+              <a:t>...     # </a:t>
+            </a:r>
+            <a:r>
+              <a:rPr lang="en-US" dirty="0" err="1">
+                <a:solidFill>
+                  <a:schemeClr val="bg1"/>
+                </a:solidFill>
+              </a:rPr>
+              <a:t>enregistrement</a:t>
+            </a:r>
+            <a:r>
+              <a:rPr lang="en-US" dirty="0">
+                <a:solidFill>
+                  <a:schemeClr val="bg1"/>
+                </a:solidFill>
+              </a:rPr>
+              <a:t> ...</a:t>
+            </a:r>
+          </a:p>
+        </p:txBody>
+      </p:sp>
+      <p:sp>
+        <p:nvSpPr>
+          <p:cNvPr id="8" name="ZoneTexte 7">
+            <a:extLst>
+              <a:ext uri="{FF2B5EF4-FFF2-40B4-BE49-F238E27FC236}">
+                <a16:creationId xmlns:a16="http://schemas.microsoft.com/office/drawing/2014/main" id="{F553A210-C8A2-4DD4-844F-FD07FA6C6E24}"/>
+              </a:ext>
+            </a:extLst>
+          </p:cNvPr>
+          <p:cNvSpPr txBox="1"/>
+          <p:nvPr/>
+        </p:nvSpPr>
+        <p:spPr>
+          <a:xfrm>
+            <a:off x="209553" y="2505074"/>
+            <a:ext cx="6062663" cy="369332"/>
+          </a:xfrm>
+          <a:prstGeom prst="rect">
+            <a:avLst/>
+          </a:prstGeom>
+          <a:noFill/>
+        </p:spPr>
+        <p:txBody>
+          <a:bodyPr wrap="square" rtlCol="0">
+            <a:spAutoFit/>
+          </a:bodyPr>
+          <a:lstStyle/>
+          <a:p>
+            <a:r>
+              <a:rPr lang="fr-FR" dirty="0"/>
+              <a:t>Ouverture d’un fichier</a:t>
+            </a:r>
+          </a:p>
+        </p:txBody>
+      </p:sp>
+      <p:sp>
+        <p:nvSpPr>
+          <p:cNvPr id="14" name="Rectangle 1">
+            <a:extLst>
+              <a:ext uri="{FF2B5EF4-FFF2-40B4-BE49-F238E27FC236}">
+                <a16:creationId xmlns:a16="http://schemas.microsoft.com/office/drawing/2014/main" id="{BB83FD6F-9F16-4756-BFAA-C80D3149CA31}"/>
+              </a:ext>
+            </a:extLst>
+          </p:cNvPr>
+          <p:cNvSpPr>
+            <a:spLocks noChangeArrowheads="1"/>
+          </p:cNvSpPr>
+          <p:nvPr/>
+        </p:nvSpPr>
+        <p:spPr bwMode="auto">
+          <a:xfrm>
+            <a:off x="85727" y="4139886"/>
+            <a:ext cx="12372972" cy="646331"/>
+          </a:xfrm>
+          <a:prstGeom prst="rect">
+            <a:avLst/>
+          </a:prstGeom>
+          <a:noFill/>
+          <a:ln>
+            <a:noFill/>
+          </a:ln>
+          <a:effectLst/>
+          <a:extLst>
+            <a:ext uri="{909E8E84-426E-40DD-AFC4-6F175D3DCCD1}">
+              <a14:hiddenFill xmlns:a14="http://schemas.microsoft.com/office/drawing/2010/main">
+                <a:solidFill>
+                  <a:schemeClr val="accent1"/>
+                </a:solidFill>
+              </a14:hiddenFill>
+            </a:ext>
+            <a:ext uri="{91240B29-F687-4F45-9708-019B960494DF}">
+              <a14:hiddenLine xmlns:a14="http://schemas.microsoft.com/office/drawing/2010/main" w="9525">
+                <a:solidFill>
+                  <a:schemeClr val="tx1"/>
+                </a:solidFill>
+                <a:miter lim="800000"/>
+                <a:headEnd/>
+                <a:tailEnd/>
+              </a14:hiddenLine>
+            </a:ext>
+            <a:ext uri="{AF507438-7753-43E0-B8FC-AC1667EBCBE1}">
+              <a14:hiddenEffects xmlns:a14="http://schemas.microsoft.com/office/drawing/2010/main">
+                <a:effectLst>
+                  <a:outerShdw dist="35921" dir="2700000" algn="ctr" rotWithShape="0">
+                    <a:schemeClr val="bg2"/>
+                  </a:outerShdw>
+                </a:effectLst>
+              </a14:hiddenEffects>
+            </a:ext>
+          </a:extLst>
+        </p:spPr>
+        <p:txBody>
+          <a:bodyPr vert="horz" wrap="square" lIns="91440" tIns="45720" rIns="91440" bIns="45720" numCol="1" anchor="ctr" anchorCtr="0" compatLnSpc="1">
+            <a:prstTxWarp prst="textNoShape">
+              <a:avLst/>
+            </a:prstTxWarp>
+            <a:spAutoFit/>
+          </a:bodyPr>
+          <a:lstStyle/>
+          <a:p>
+            <a:pPr lvl="0" eaLnBrk="0" fontAlgn="base" hangingPunct="0">
+              <a:spcBef>
+                <a:spcPct val="0"/>
+              </a:spcBef>
+              <a:spcAft>
+                <a:spcPct val="0"/>
+              </a:spcAft>
+            </a:pPr>
+            <a:r>
+              <a:rPr lang="fr-FR" altLang="fr-FR" dirty="0"/>
+              <a:t>Notez le mode d'ouverture : on ouvre le fichier données en mode d'écriture binaire. Il suffit de rajouter, derrière la lettre symbolisant le mode, la lettre b pour indiquer un mode binaire.</a:t>
+            </a:r>
+          </a:p>
+        </p:txBody>
+      </p:sp>
+    </p:spTree>
+    <p:extLst>
+      <p:ext uri="{BB962C8B-B14F-4D97-AF65-F5344CB8AC3E}">
+        <p14:creationId xmlns:p14="http://schemas.microsoft.com/office/powerpoint/2010/main" val="278980803"/>
+      </p:ext>
+    </p:extLst>
+  </p:cSld>
+  <p:clrMapOvr>
+    <a:masterClrMapping/>
+  </p:clrMapOvr>
+</p:sld>
+</file>
+
+<file path=ppt/slides/slide95.xml><?xml version="1.0" encoding="utf-8"?>
+<p:sld xmlns:a="http://schemas.openxmlformats.org/drawingml/2006/main" xmlns:r="http://schemas.openxmlformats.org/officeDocument/2006/relationships" xmlns:p="http://schemas.openxmlformats.org/presentationml/2006/main">
+  <p:cSld>
+    <p:spTree>
+      <p:nvGrpSpPr>
+        <p:cNvPr id="1" name=""/>
+        <p:cNvGrpSpPr/>
+        <p:nvPr/>
+      </p:nvGrpSpPr>
+      <p:grpSpPr>
+        <a:xfrm>
+          <a:off x="0" y="0"/>
+          <a:ext cx="0" cy="0"/>
+          <a:chOff x="0" y="0"/>
+          <a:chExt cx="0" cy="0"/>
+        </a:xfrm>
+      </p:grpSpPr>
+      <p:sp>
+        <p:nvSpPr>
+          <p:cNvPr id="3" name="Espace réservé du contenu 2">
+            <a:extLst>
+              <a:ext uri="{FF2B5EF4-FFF2-40B4-BE49-F238E27FC236}">
+                <a16:creationId xmlns:a16="http://schemas.microsoft.com/office/drawing/2014/main" id="{26019C14-248F-4937-B7A1-BB6BDCB8ED35}"/>
+              </a:ext>
+            </a:extLst>
+          </p:cNvPr>
+          <p:cNvSpPr>
+            <a:spLocks noGrp="1"/>
+          </p:cNvSpPr>
+          <p:nvPr>
+            <p:ph idx="1"/>
+          </p:nvPr>
+        </p:nvSpPr>
+        <p:spPr>
+          <a:xfrm>
+            <a:off x="1" y="0"/>
+            <a:ext cx="12191999" cy="6857999"/>
+          </a:xfrm>
+          <a:gradFill>
+            <a:gsLst>
+              <a:gs pos="0">
+                <a:schemeClr val="bg2">
+                  <a:lumMod val="90000"/>
+                </a:schemeClr>
+              </a:gs>
+              <a:gs pos="100000">
+                <a:schemeClr val="bg2">
+                  <a:lumMod val="25000"/>
+                </a:schemeClr>
+              </a:gs>
+            </a:gsLst>
+            <a:lin ang="5400000" scaled="1"/>
+          </a:gradFill>
+        </p:spPr>
+        <p:txBody>
+          <a:bodyPr/>
+          <a:lstStyle/>
+          <a:p>
+            <a:pPr marL="0" indent="0">
+              <a:buNone/>
+            </a:pPr>
+            <a:r>
+              <a:rPr lang="fr-FR" dirty="0"/>
+              <a:t>	</a:t>
+            </a:r>
+          </a:p>
+          <a:p>
+            <a:pPr marL="0" indent="0">
+              <a:buNone/>
+            </a:pPr>
+            <a:endParaRPr lang="fr-FR" dirty="0"/>
+          </a:p>
+          <a:p>
+            <a:pPr marL="0" indent="0">
+              <a:buNone/>
+            </a:pPr>
+            <a:endParaRPr lang="fr-FR" dirty="0"/>
+          </a:p>
+          <a:p>
+            <a:pPr marL="0" indent="0">
+              <a:buNone/>
+            </a:pPr>
+            <a:endParaRPr lang="fr-FR" sz="1400" dirty="0"/>
+          </a:p>
+          <a:p>
+            <a:pPr marL="0" indent="0">
+              <a:lnSpc>
+                <a:spcPct val="100000"/>
+              </a:lnSpc>
+              <a:buNone/>
+            </a:pPr>
+            <a:endParaRPr lang="fr-FR" sz="1400" b="1" dirty="0"/>
+          </a:p>
+        </p:txBody>
+      </p:sp>
+      <p:sp>
+        <p:nvSpPr>
+          <p:cNvPr id="2" name="Titre 1">
+            <a:extLst>
+              <a:ext uri="{FF2B5EF4-FFF2-40B4-BE49-F238E27FC236}">
+                <a16:creationId xmlns:a16="http://schemas.microsoft.com/office/drawing/2014/main" id="{C2DDB91C-04E9-41CA-9731-E7D1B6B6D47E}"/>
+              </a:ext>
+            </a:extLst>
+          </p:cNvPr>
+          <p:cNvSpPr>
+            <a:spLocks noGrp="1"/>
+          </p:cNvSpPr>
+          <p:nvPr>
+            <p:ph type="title"/>
+          </p:nvPr>
+        </p:nvSpPr>
+        <p:spPr>
+          <a:xfrm>
+            <a:off x="-266698" y="0"/>
+            <a:ext cx="12192000" cy="1325563"/>
+          </a:xfrm>
+        </p:spPr>
+        <p:txBody>
+          <a:bodyPr>
+            <a:noAutofit/>
+          </a:bodyPr>
+          <a:lstStyle/>
+          <a:p>
+            <a:pPr lvl="0" algn="ctr" fontAlgn="base">
+              <a:spcAft>
+                <a:spcPct val="0"/>
+              </a:spcAft>
+            </a:pPr>
+            <a:r>
+              <a:rPr lang="fr-FR" altLang="fr-FR" sz="6000" dirty="0">
+                <a:solidFill>
+                  <a:schemeClr val="accent5">
+                    <a:lumMod val="75000"/>
+                  </a:schemeClr>
+                </a:solidFill>
+              </a:rPr>
+              <a:t>Utiliser des fichiers 3</a:t>
+            </a:r>
+            <a:endParaRPr lang="fr-FR" altLang="fr-FR" sz="6000" b="1" dirty="0">
+              <a:solidFill>
+                <a:schemeClr val="accent5">
+                  <a:lumMod val="75000"/>
+                </a:schemeClr>
+              </a:solidFill>
+            </a:endParaRPr>
+          </a:p>
+        </p:txBody>
+      </p:sp>
+      <p:sp>
+        <p:nvSpPr>
+          <p:cNvPr id="4" name="ZoneTexte 3">
+            <a:extLst>
+              <a:ext uri="{FF2B5EF4-FFF2-40B4-BE49-F238E27FC236}">
+                <a16:creationId xmlns:a16="http://schemas.microsoft.com/office/drawing/2014/main" id="{318E8B91-EB38-4F32-897B-41BFDFA2D26D}"/>
+              </a:ext>
+            </a:extLst>
+          </p:cNvPr>
+          <p:cNvSpPr txBox="1"/>
+          <p:nvPr/>
+        </p:nvSpPr>
+        <p:spPr>
+          <a:xfrm>
+            <a:off x="209554" y="12012972"/>
+            <a:ext cx="11715748" cy="914400"/>
+          </a:xfrm>
+          <a:prstGeom prst="rect">
+            <a:avLst/>
+          </a:prstGeom>
+          <a:noFill/>
+        </p:spPr>
+        <p:txBody>
+          <a:bodyPr wrap="square" rtlCol="0">
+            <a:spAutoFit/>
+          </a:bodyPr>
+          <a:lstStyle/>
+          <a:p>
+            <a:endParaRPr lang="fr-FR" dirty="0"/>
+          </a:p>
+        </p:txBody>
+      </p:sp>
+      <p:sp>
+        <p:nvSpPr>
+          <p:cNvPr id="5" name="ZoneTexte 4">
+            <a:extLst>
+              <a:ext uri="{FF2B5EF4-FFF2-40B4-BE49-F238E27FC236}">
+                <a16:creationId xmlns:a16="http://schemas.microsoft.com/office/drawing/2014/main" id="{5ED24F53-74E8-4CB8-AE4D-1EC67A8AAC6F}"/>
+              </a:ext>
+            </a:extLst>
+          </p:cNvPr>
+          <p:cNvSpPr txBox="1"/>
+          <p:nvPr/>
+        </p:nvSpPr>
+        <p:spPr>
+          <a:xfrm>
+            <a:off x="209554" y="1252537"/>
+            <a:ext cx="11906246" cy="646331"/>
+          </a:xfrm>
+          <a:prstGeom prst="rect">
+            <a:avLst/>
+          </a:prstGeom>
+          <a:noFill/>
+        </p:spPr>
+        <p:txBody>
+          <a:bodyPr wrap="square" rtlCol="0">
+            <a:spAutoFit/>
+          </a:bodyPr>
+          <a:lstStyle/>
+          <a:p>
+            <a:r>
+              <a:rPr lang="fr-FR" b="1" dirty="0"/>
+              <a:t>Enregistrer un objet dans un fichier</a:t>
+            </a:r>
+          </a:p>
+          <a:p>
+            <a:r>
+              <a:rPr lang="fr-FR" dirty="0"/>
+              <a:t>On utilise la </a:t>
+            </a:r>
+            <a:r>
+              <a:rPr lang="fr-FR" dirty="0" err="1"/>
+              <a:t>methode</a:t>
+            </a:r>
+            <a:r>
+              <a:rPr lang="fr-FR" dirty="0"/>
+              <a:t> </a:t>
+            </a:r>
+            <a:r>
+              <a:rPr lang="fr-FR" b="1" dirty="0"/>
+              <a:t>dump</a:t>
+            </a:r>
+            <a:r>
+              <a:rPr lang="fr-FR" dirty="0"/>
+              <a:t> du pickler pour enregistrer l’objet. Son emploi est des plus simples:</a:t>
+            </a:r>
+          </a:p>
+        </p:txBody>
+      </p:sp>
+      <p:sp>
+        <p:nvSpPr>
+          <p:cNvPr id="6" name="ZoneTexte 5">
+            <a:extLst>
+              <a:ext uri="{FF2B5EF4-FFF2-40B4-BE49-F238E27FC236}">
+                <a16:creationId xmlns:a16="http://schemas.microsoft.com/office/drawing/2014/main" id="{10C77C71-0A30-43E5-960B-4E7F441401F7}"/>
+              </a:ext>
+            </a:extLst>
+          </p:cNvPr>
+          <p:cNvSpPr txBox="1"/>
+          <p:nvPr/>
+        </p:nvSpPr>
+        <p:spPr>
+          <a:xfrm>
+            <a:off x="333379" y="2225069"/>
+            <a:ext cx="6062663" cy="2585323"/>
+          </a:xfrm>
+          <a:prstGeom prst="rect">
+            <a:avLst/>
+          </a:prstGeom>
+          <a:solidFill>
+            <a:schemeClr val="tx1"/>
+          </a:solidFill>
+        </p:spPr>
+        <p:txBody>
+          <a:bodyPr wrap="square" rtlCol="0">
+            <a:spAutoFit/>
+          </a:bodyPr>
+          <a:lstStyle/>
+          <a:p>
+            <a:r>
+              <a:rPr lang="fr-FR" dirty="0">
+                <a:solidFill>
+                  <a:schemeClr val="bg1"/>
+                </a:solidFill>
+              </a:rPr>
+              <a:t>score = {</a:t>
+            </a:r>
+          </a:p>
+          <a:p>
+            <a:r>
+              <a:rPr lang="fr-FR" dirty="0">
+                <a:solidFill>
+                  <a:schemeClr val="bg1"/>
+                </a:solidFill>
+              </a:rPr>
+              <a:t>...   "joueur 1":    5,</a:t>
+            </a:r>
+          </a:p>
+          <a:p>
+            <a:r>
+              <a:rPr lang="fr-FR" dirty="0">
+                <a:solidFill>
+                  <a:schemeClr val="bg1"/>
+                </a:solidFill>
+              </a:rPr>
+              <a:t>...   "joueur 2":   35,</a:t>
+            </a:r>
+          </a:p>
+          <a:p>
+            <a:r>
+              <a:rPr lang="fr-FR" dirty="0">
+                <a:solidFill>
+                  <a:schemeClr val="bg1"/>
+                </a:solidFill>
+              </a:rPr>
+              <a:t>...   "joueur 3":   20,</a:t>
+            </a:r>
+          </a:p>
+          <a:p>
+            <a:r>
+              <a:rPr lang="fr-FR" dirty="0">
+                <a:solidFill>
+                  <a:schemeClr val="bg1"/>
+                </a:solidFill>
+              </a:rPr>
+              <a:t>...   "joueur 4":    2,</a:t>
+            </a:r>
+          </a:p>
+          <a:p>
+            <a:r>
+              <a:rPr lang="fr-FR" dirty="0">
+                <a:solidFill>
+                  <a:schemeClr val="bg1"/>
+                </a:solidFill>
+              </a:rPr>
+              <a:t>}</a:t>
+            </a:r>
+          </a:p>
+          <a:p>
+            <a:r>
+              <a:rPr lang="fr-FR" dirty="0">
+                <a:solidFill>
+                  <a:schemeClr val="bg1"/>
+                </a:solidFill>
+              </a:rPr>
+              <a:t>with open('</a:t>
+            </a:r>
+            <a:r>
+              <a:rPr lang="fr-FR" dirty="0" err="1">
+                <a:solidFill>
+                  <a:schemeClr val="bg1"/>
+                </a:solidFill>
+              </a:rPr>
+              <a:t>donnees</a:t>
+            </a:r>
+            <a:r>
+              <a:rPr lang="fr-FR" dirty="0">
+                <a:solidFill>
+                  <a:schemeClr val="bg1"/>
+                </a:solidFill>
+              </a:rPr>
+              <a:t>', '</a:t>
+            </a:r>
+            <a:r>
+              <a:rPr lang="fr-FR" dirty="0" err="1">
+                <a:solidFill>
+                  <a:schemeClr val="bg1"/>
+                </a:solidFill>
+              </a:rPr>
+              <a:t>wb</a:t>
+            </a:r>
+            <a:r>
+              <a:rPr lang="fr-FR" dirty="0">
+                <a:solidFill>
+                  <a:schemeClr val="bg1"/>
+                </a:solidFill>
+              </a:rPr>
+              <a:t>') as fichier:</a:t>
+            </a:r>
+          </a:p>
+          <a:p>
+            <a:r>
+              <a:rPr lang="fr-FR" dirty="0">
+                <a:solidFill>
+                  <a:schemeClr val="bg1"/>
+                </a:solidFill>
+              </a:rPr>
+              <a:t>...     </a:t>
+            </a:r>
+            <a:r>
+              <a:rPr lang="fr-FR" dirty="0" err="1">
+                <a:solidFill>
+                  <a:schemeClr val="bg1"/>
+                </a:solidFill>
+              </a:rPr>
+              <a:t>mon_pickler</a:t>
+            </a:r>
+            <a:r>
+              <a:rPr lang="fr-FR" dirty="0">
+                <a:solidFill>
+                  <a:schemeClr val="bg1"/>
+                </a:solidFill>
+              </a:rPr>
+              <a:t> = </a:t>
+            </a:r>
+            <a:r>
+              <a:rPr lang="fr-FR" dirty="0" err="1">
+                <a:solidFill>
+                  <a:schemeClr val="bg1"/>
+                </a:solidFill>
+              </a:rPr>
+              <a:t>pickle.Pickler</a:t>
+            </a:r>
+            <a:r>
+              <a:rPr lang="fr-FR" dirty="0">
+                <a:solidFill>
+                  <a:schemeClr val="bg1"/>
+                </a:solidFill>
+              </a:rPr>
+              <a:t>(fichier)</a:t>
+            </a:r>
+          </a:p>
+          <a:p>
+            <a:r>
+              <a:rPr lang="fr-FR" dirty="0">
+                <a:solidFill>
+                  <a:schemeClr val="bg1"/>
+                </a:solidFill>
+              </a:rPr>
+              <a:t>...     </a:t>
+            </a:r>
+            <a:r>
+              <a:rPr lang="fr-FR" dirty="0" err="1">
+                <a:solidFill>
+                  <a:schemeClr val="bg1"/>
+                </a:solidFill>
+              </a:rPr>
+              <a:t>mon_pickler.dump</a:t>
+            </a:r>
+            <a:r>
+              <a:rPr lang="fr-FR" dirty="0">
+                <a:solidFill>
+                  <a:schemeClr val="bg1"/>
+                </a:solidFill>
+              </a:rPr>
+              <a:t>(score)</a:t>
+            </a:r>
+          </a:p>
+        </p:txBody>
+      </p:sp>
+    </p:spTree>
+    <p:extLst>
+      <p:ext uri="{BB962C8B-B14F-4D97-AF65-F5344CB8AC3E}">
+        <p14:creationId xmlns:p14="http://schemas.microsoft.com/office/powerpoint/2010/main" val="1648463173"/>
+      </p:ext>
+    </p:extLst>
+  </p:cSld>
+  <p:clrMapOvr>
+    <a:masterClrMapping/>
+  </p:clrMapOvr>
+</p:sld>
+</file>
+
+<file path=ppt/slides/slide96.xml><?xml version="1.0" encoding="utf-8"?>
+<p:sld xmlns:a="http://schemas.openxmlformats.org/drawingml/2006/main" xmlns:r="http://schemas.openxmlformats.org/officeDocument/2006/relationships" xmlns:p="http://schemas.openxmlformats.org/presentationml/2006/main">
+  <p:cSld>
+    <p:spTree>
+      <p:nvGrpSpPr>
+        <p:cNvPr id="1" name=""/>
+        <p:cNvGrpSpPr/>
+        <p:nvPr/>
+      </p:nvGrpSpPr>
+      <p:grpSpPr>
+        <a:xfrm>
+          <a:off x="0" y="0"/>
+          <a:ext cx="0" cy="0"/>
+          <a:chOff x="0" y="0"/>
+          <a:chExt cx="0" cy="0"/>
+        </a:xfrm>
+      </p:grpSpPr>
+      <p:sp>
+        <p:nvSpPr>
+          <p:cNvPr id="3" name="Espace réservé du contenu 2">
+            <a:extLst>
+              <a:ext uri="{FF2B5EF4-FFF2-40B4-BE49-F238E27FC236}">
+                <a16:creationId xmlns:a16="http://schemas.microsoft.com/office/drawing/2014/main" id="{26019C14-248F-4937-B7A1-BB6BDCB8ED35}"/>
+              </a:ext>
+            </a:extLst>
+          </p:cNvPr>
+          <p:cNvSpPr>
+            <a:spLocks noGrp="1"/>
+          </p:cNvSpPr>
+          <p:nvPr>
+            <p:ph idx="1"/>
+          </p:nvPr>
+        </p:nvSpPr>
+        <p:spPr>
+          <a:xfrm>
+            <a:off x="1" y="0"/>
+            <a:ext cx="12191999" cy="6857999"/>
+          </a:xfrm>
+          <a:gradFill>
+            <a:gsLst>
+              <a:gs pos="0">
+                <a:schemeClr val="bg2">
+                  <a:lumMod val="90000"/>
+                </a:schemeClr>
+              </a:gs>
+              <a:gs pos="100000">
+                <a:schemeClr val="bg2">
+                  <a:lumMod val="25000"/>
+                </a:schemeClr>
+              </a:gs>
+            </a:gsLst>
+            <a:lin ang="5400000" scaled="1"/>
+          </a:gradFill>
+        </p:spPr>
+        <p:txBody>
+          <a:bodyPr/>
+          <a:lstStyle/>
+          <a:p>
+            <a:pPr marL="0" indent="0">
+              <a:buNone/>
+            </a:pPr>
+            <a:r>
+              <a:rPr lang="fr-FR" dirty="0"/>
+              <a:t>	</a:t>
+            </a:r>
+          </a:p>
+          <a:p>
+            <a:pPr marL="0" indent="0">
+              <a:buNone/>
+            </a:pPr>
+            <a:endParaRPr lang="fr-FR" dirty="0"/>
+          </a:p>
+          <a:p>
+            <a:pPr marL="0" indent="0">
+              <a:buNone/>
+            </a:pPr>
+            <a:endParaRPr lang="fr-FR" dirty="0"/>
+          </a:p>
+          <a:p>
+            <a:pPr marL="0" indent="0">
+              <a:buNone/>
+            </a:pPr>
+            <a:endParaRPr lang="fr-FR" sz="1400" dirty="0"/>
+          </a:p>
+          <a:p>
+            <a:pPr marL="0" indent="0">
+              <a:lnSpc>
+                <a:spcPct val="100000"/>
+              </a:lnSpc>
+              <a:buNone/>
+            </a:pPr>
+            <a:endParaRPr lang="fr-FR" sz="1400" b="1" dirty="0"/>
+          </a:p>
+        </p:txBody>
+      </p:sp>
+      <p:sp>
+        <p:nvSpPr>
+          <p:cNvPr id="2" name="Titre 1">
+            <a:extLst>
+              <a:ext uri="{FF2B5EF4-FFF2-40B4-BE49-F238E27FC236}">
+                <a16:creationId xmlns:a16="http://schemas.microsoft.com/office/drawing/2014/main" id="{C2DDB91C-04E9-41CA-9731-E7D1B6B6D47E}"/>
+              </a:ext>
+            </a:extLst>
+          </p:cNvPr>
+          <p:cNvSpPr>
+            <a:spLocks noGrp="1"/>
+          </p:cNvSpPr>
+          <p:nvPr>
+            <p:ph type="title"/>
+          </p:nvPr>
+        </p:nvSpPr>
+        <p:spPr>
+          <a:xfrm>
+            <a:off x="-266698" y="0"/>
+            <a:ext cx="12192000" cy="1325563"/>
+          </a:xfrm>
+        </p:spPr>
+        <p:txBody>
+          <a:bodyPr>
+            <a:noAutofit/>
+          </a:bodyPr>
+          <a:lstStyle/>
+          <a:p>
+            <a:pPr lvl="0" algn="ctr" fontAlgn="base">
+              <a:spcAft>
+                <a:spcPct val="0"/>
+              </a:spcAft>
+            </a:pPr>
+            <a:r>
+              <a:rPr lang="fr-FR" altLang="fr-FR" sz="6000" dirty="0">
+                <a:solidFill>
+                  <a:schemeClr val="accent5">
+                    <a:lumMod val="75000"/>
+                  </a:schemeClr>
+                </a:solidFill>
+              </a:rPr>
+              <a:t>Utiliser des fichiers 4</a:t>
+            </a:r>
+            <a:endParaRPr lang="fr-FR" altLang="fr-FR" sz="6000" b="1" dirty="0">
+              <a:solidFill>
+                <a:schemeClr val="accent5">
+                  <a:lumMod val="75000"/>
+                </a:schemeClr>
+              </a:solidFill>
+            </a:endParaRPr>
+          </a:p>
+        </p:txBody>
+      </p:sp>
+      <p:sp>
+        <p:nvSpPr>
+          <p:cNvPr id="4" name="ZoneTexte 3">
+            <a:extLst>
+              <a:ext uri="{FF2B5EF4-FFF2-40B4-BE49-F238E27FC236}">
+                <a16:creationId xmlns:a16="http://schemas.microsoft.com/office/drawing/2014/main" id="{318E8B91-EB38-4F32-897B-41BFDFA2D26D}"/>
+              </a:ext>
+            </a:extLst>
+          </p:cNvPr>
+          <p:cNvSpPr txBox="1"/>
+          <p:nvPr/>
+        </p:nvSpPr>
+        <p:spPr>
+          <a:xfrm>
+            <a:off x="209554" y="12012972"/>
+            <a:ext cx="11715748" cy="914400"/>
+          </a:xfrm>
+          <a:prstGeom prst="rect">
+            <a:avLst/>
+          </a:prstGeom>
+          <a:noFill/>
+        </p:spPr>
+        <p:txBody>
+          <a:bodyPr wrap="square" rtlCol="0">
+            <a:spAutoFit/>
+          </a:bodyPr>
+          <a:lstStyle/>
+          <a:p>
+            <a:endParaRPr lang="fr-FR" dirty="0"/>
+          </a:p>
+        </p:txBody>
+      </p:sp>
+      <p:sp>
+        <p:nvSpPr>
+          <p:cNvPr id="5" name="ZoneTexte 4">
+            <a:extLst>
+              <a:ext uri="{FF2B5EF4-FFF2-40B4-BE49-F238E27FC236}">
+                <a16:creationId xmlns:a16="http://schemas.microsoft.com/office/drawing/2014/main" id="{5ED24F53-74E8-4CB8-AE4D-1EC67A8AAC6F}"/>
+              </a:ext>
+            </a:extLst>
+          </p:cNvPr>
+          <p:cNvSpPr txBox="1"/>
+          <p:nvPr/>
+        </p:nvSpPr>
+        <p:spPr>
+          <a:xfrm>
+            <a:off x="209554" y="1252537"/>
+            <a:ext cx="11906246" cy="1477328"/>
+          </a:xfrm>
+          <a:prstGeom prst="rect">
+            <a:avLst/>
+          </a:prstGeom>
+          <a:noFill/>
+        </p:spPr>
+        <p:txBody>
+          <a:bodyPr wrap="square" rtlCol="0">
+            <a:spAutoFit/>
+          </a:bodyPr>
+          <a:lstStyle/>
+          <a:p>
+            <a:r>
+              <a:rPr lang="fr-FR" b="1" dirty="0"/>
+              <a:t>Récupérer nos objet enregistres</a:t>
+            </a:r>
+          </a:p>
+          <a:p>
+            <a:r>
+              <a:rPr lang="fr-FR" dirty="0"/>
+              <a:t>Nous allons utiliser une autre classe définie dans notre module pickle. Cette fois, assez logiquement, c'est la classe </a:t>
+            </a:r>
+            <a:r>
+              <a:rPr lang="fr-FR" dirty="0" err="1"/>
+              <a:t>Unpickler</a:t>
+            </a:r>
+            <a:r>
+              <a:rPr lang="fr-FR" dirty="0"/>
+              <a:t>.</a:t>
+            </a:r>
+          </a:p>
+          <a:p>
+            <a:endParaRPr lang="fr-FR" dirty="0"/>
+          </a:p>
+          <a:p>
+            <a:r>
+              <a:rPr lang="fr-FR" dirty="0"/>
+              <a:t>Commençons par créer notre objet. À sa création, on lui passe le fichier dans lequel on va lire les objets. Puisqu'on va lire, on change de mode, on repasse en mode r, et même </a:t>
+            </a:r>
+            <a:r>
+              <a:rPr lang="fr-FR" dirty="0" err="1"/>
+              <a:t>rb</a:t>
+            </a:r>
+            <a:r>
+              <a:rPr lang="fr-FR" dirty="0"/>
+              <a:t> puisque le fichier est binaire.</a:t>
+            </a:r>
+          </a:p>
+        </p:txBody>
+      </p:sp>
+      <p:sp>
+        <p:nvSpPr>
+          <p:cNvPr id="6" name="ZoneTexte 5">
+            <a:extLst>
+              <a:ext uri="{FF2B5EF4-FFF2-40B4-BE49-F238E27FC236}">
+                <a16:creationId xmlns:a16="http://schemas.microsoft.com/office/drawing/2014/main" id="{10C77C71-0A30-43E5-960B-4E7F441401F7}"/>
+              </a:ext>
+            </a:extLst>
+          </p:cNvPr>
+          <p:cNvSpPr txBox="1"/>
+          <p:nvPr/>
+        </p:nvSpPr>
+        <p:spPr>
+          <a:xfrm>
+            <a:off x="285754" y="2835474"/>
+            <a:ext cx="6062663" cy="1200329"/>
+          </a:xfrm>
+          <a:prstGeom prst="rect">
+            <a:avLst/>
+          </a:prstGeom>
+          <a:solidFill>
+            <a:schemeClr val="tx1"/>
+          </a:solidFill>
+        </p:spPr>
+        <p:txBody>
+          <a:bodyPr wrap="square" rtlCol="0">
+            <a:spAutoFit/>
+          </a:bodyPr>
+          <a:lstStyle/>
+          <a:p>
+            <a:r>
+              <a:rPr lang="fr-FR" dirty="0">
+                <a:solidFill>
+                  <a:schemeClr val="bg1"/>
+                </a:solidFill>
+              </a:rPr>
+              <a:t>with open('</a:t>
+            </a:r>
+            <a:r>
+              <a:rPr lang="fr-FR" dirty="0" err="1">
+                <a:solidFill>
+                  <a:schemeClr val="bg1"/>
+                </a:solidFill>
+              </a:rPr>
+              <a:t>donnees</a:t>
+            </a:r>
+            <a:r>
+              <a:rPr lang="fr-FR" dirty="0">
+                <a:solidFill>
+                  <a:schemeClr val="bg1"/>
+                </a:solidFill>
+              </a:rPr>
+              <a:t>', '</a:t>
+            </a:r>
+            <a:r>
+              <a:rPr lang="fr-FR" dirty="0" err="1">
+                <a:solidFill>
+                  <a:schemeClr val="bg1"/>
+                </a:solidFill>
+              </a:rPr>
+              <a:t>rb</a:t>
+            </a:r>
+            <a:r>
+              <a:rPr lang="fr-FR" dirty="0">
+                <a:solidFill>
+                  <a:schemeClr val="bg1"/>
+                </a:solidFill>
+              </a:rPr>
+              <a:t>') as fichier:</a:t>
+            </a:r>
+          </a:p>
+          <a:p>
+            <a:r>
+              <a:rPr lang="fr-FR" dirty="0">
+                <a:solidFill>
+                  <a:schemeClr val="bg1"/>
+                </a:solidFill>
+              </a:rPr>
+              <a:t>...     mon_depickler = </a:t>
+            </a:r>
+            <a:r>
+              <a:rPr lang="fr-FR" dirty="0" err="1">
+                <a:solidFill>
+                  <a:schemeClr val="bg1"/>
+                </a:solidFill>
+              </a:rPr>
+              <a:t>pickle.Unpickler</a:t>
+            </a:r>
+            <a:r>
+              <a:rPr lang="fr-FR" dirty="0">
+                <a:solidFill>
+                  <a:schemeClr val="bg1"/>
+                </a:solidFill>
+              </a:rPr>
+              <a:t>(fichier)</a:t>
+            </a:r>
+          </a:p>
+          <a:p>
+            <a:r>
+              <a:rPr lang="fr-FR" dirty="0">
+                <a:solidFill>
+                  <a:schemeClr val="bg1"/>
+                </a:solidFill>
+              </a:rPr>
+              <a:t>...     # Lecture des objets contenus dans le fichier...</a:t>
+            </a:r>
+          </a:p>
+          <a:p>
+            <a:r>
+              <a:rPr lang="fr-FR" dirty="0">
+                <a:solidFill>
+                  <a:schemeClr val="bg1"/>
+                </a:solidFill>
+              </a:rPr>
+              <a:t>... </a:t>
+            </a:r>
+          </a:p>
+        </p:txBody>
+      </p:sp>
+      <p:sp>
+        <p:nvSpPr>
+          <p:cNvPr id="7" name="Rectangle 1">
+            <a:extLst>
+              <a:ext uri="{FF2B5EF4-FFF2-40B4-BE49-F238E27FC236}">
+                <a16:creationId xmlns:a16="http://schemas.microsoft.com/office/drawing/2014/main" id="{7653991C-D714-48A6-A99D-F186DB9487CF}"/>
+              </a:ext>
+            </a:extLst>
+          </p:cNvPr>
+          <p:cNvSpPr>
+            <a:spLocks noChangeArrowheads="1"/>
+          </p:cNvSpPr>
+          <p:nvPr/>
+        </p:nvSpPr>
+        <p:spPr bwMode="auto">
+          <a:xfrm>
+            <a:off x="209554" y="4035803"/>
+            <a:ext cx="11796434" cy="646331"/>
+          </a:xfrm>
+          <a:prstGeom prst="rect">
+            <a:avLst/>
+          </a:prstGeom>
+          <a:noFill/>
+          <a:ln>
+            <a:noFill/>
+          </a:ln>
+          <a:effectLst/>
+          <a:extLst>
+            <a:ext uri="{909E8E84-426E-40DD-AFC4-6F175D3DCCD1}">
+              <a14:hiddenFill xmlns:a14="http://schemas.microsoft.com/office/drawing/2010/main">
+                <a:solidFill>
+                  <a:schemeClr val="accent1"/>
+                </a:solidFill>
+              </a14:hiddenFill>
+            </a:ext>
+            <a:ext uri="{91240B29-F687-4F45-9708-019B960494DF}">
+              <a14:hiddenLine xmlns:a14="http://schemas.microsoft.com/office/drawing/2010/main" w="9525">
+                <a:solidFill>
+                  <a:schemeClr val="tx1"/>
+                </a:solidFill>
+                <a:miter lim="800000"/>
+                <a:headEnd/>
+                <a:tailEnd/>
+              </a14:hiddenLine>
+            </a:ext>
+            <a:ext uri="{AF507438-7753-43E0-B8FC-AC1667EBCBE1}">
+              <a14:hiddenEffects xmlns:a14="http://schemas.microsoft.com/office/drawing/2010/main">
+                <a:effectLst>
+                  <a:outerShdw dist="35921" dir="2700000" algn="ctr" rotWithShape="0">
+                    <a:schemeClr val="bg2"/>
+                  </a:outerShdw>
+                </a:effectLst>
+              </a14:hiddenEffects>
+            </a:ext>
+          </a:extLst>
+        </p:spPr>
+        <p:txBody>
+          <a:bodyPr vert="horz" wrap="none" lIns="91440" tIns="45720" rIns="91440" bIns="45720" numCol="1" anchor="ctr" anchorCtr="0" compatLnSpc="1">
+            <a:prstTxWarp prst="textNoShape">
+              <a:avLst/>
+            </a:prstTxWarp>
+            <a:spAutoFit/>
+          </a:bodyPr>
+          <a:lstStyle/>
+          <a:p>
+            <a:pPr marL="0" marR="0" lvl="0" indent="0" algn="l" defTabSz="914400" rtl="0" eaLnBrk="0" fontAlgn="base" latinLnBrk="0" hangingPunct="0">
+              <a:lnSpc>
+                <a:spcPct val="100000"/>
+              </a:lnSpc>
+              <a:spcBef>
+                <a:spcPct val="0"/>
+              </a:spcBef>
+              <a:spcAft>
+                <a:spcPct val="0"/>
+              </a:spcAft>
+              <a:buClrTx/>
+              <a:buSzTx/>
+              <a:buFontTx/>
+              <a:buNone/>
+              <a:tabLst/>
+            </a:pPr>
+            <a:r>
+              <a:rPr lang="fr-FR" altLang="fr-FR" dirty="0"/>
+              <a:t>Pour lire l'objet dans notre fichier, il faut appeler la méthode </a:t>
+            </a:r>
+            <a:r>
+              <a:rPr lang="fr-FR" altLang="fr-FR" dirty="0" err="1"/>
+              <a:t>load</a:t>
+            </a:r>
+            <a:r>
+              <a:rPr lang="fr-FR" altLang="fr-FR" dirty="0"/>
+              <a:t> de notre </a:t>
+            </a:r>
+            <a:r>
+              <a:rPr lang="fr-FR" altLang="fr-FR" dirty="0" err="1"/>
+              <a:t>depickler</a:t>
+            </a:r>
+            <a:r>
+              <a:rPr lang="fr-FR" altLang="fr-FR" dirty="0"/>
+              <a:t>. Elle renvoie le premier objet qui a été </a:t>
+            </a:r>
+          </a:p>
+          <a:p>
+            <a:pPr marL="0" marR="0" lvl="0" indent="0" algn="l" defTabSz="914400" rtl="0" eaLnBrk="0" fontAlgn="base" latinLnBrk="0" hangingPunct="0">
+              <a:lnSpc>
+                <a:spcPct val="100000"/>
+              </a:lnSpc>
+              <a:spcBef>
+                <a:spcPct val="0"/>
+              </a:spcBef>
+              <a:spcAft>
+                <a:spcPct val="0"/>
+              </a:spcAft>
+              <a:buClrTx/>
+              <a:buSzTx/>
+              <a:buFontTx/>
+              <a:buNone/>
+              <a:tabLst/>
+            </a:pPr>
+            <a:r>
+              <a:rPr lang="fr-FR" altLang="fr-FR" dirty="0"/>
+              <a:t>lu (s'il y en a plusieurs, il faut l'appeler plusieurs fois). </a:t>
+            </a:r>
+          </a:p>
+        </p:txBody>
+      </p:sp>
+      <p:sp>
+        <p:nvSpPr>
+          <p:cNvPr id="10" name="ZoneTexte 9">
+            <a:extLst>
+              <a:ext uri="{FF2B5EF4-FFF2-40B4-BE49-F238E27FC236}">
+                <a16:creationId xmlns:a16="http://schemas.microsoft.com/office/drawing/2014/main" id="{286BFFD8-58D4-4DB9-B381-30E743BE6F58}"/>
+              </a:ext>
+            </a:extLst>
+          </p:cNvPr>
+          <p:cNvSpPr txBox="1"/>
+          <p:nvPr/>
+        </p:nvSpPr>
+        <p:spPr>
+          <a:xfrm>
+            <a:off x="285753" y="4741576"/>
+            <a:ext cx="6062663" cy="923330"/>
+          </a:xfrm>
+          <a:prstGeom prst="rect">
+            <a:avLst/>
+          </a:prstGeom>
+          <a:solidFill>
+            <a:schemeClr val="tx1"/>
+          </a:solidFill>
+        </p:spPr>
+        <p:txBody>
+          <a:bodyPr wrap="square" rtlCol="0">
+            <a:spAutoFit/>
+          </a:bodyPr>
+          <a:lstStyle/>
+          <a:p>
+            <a:r>
+              <a:rPr lang="fr-FR" dirty="0">
+                <a:solidFill>
+                  <a:schemeClr val="bg1"/>
+                </a:solidFill>
+              </a:rPr>
+              <a:t>with open('</a:t>
+            </a:r>
+            <a:r>
+              <a:rPr lang="fr-FR" dirty="0" err="1">
+                <a:solidFill>
+                  <a:schemeClr val="bg1"/>
+                </a:solidFill>
+              </a:rPr>
+              <a:t>donnees</a:t>
+            </a:r>
+            <a:r>
+              <a:rPr lang="fr-FR" dirty="0">
+                <a:solidFill>
+                  <a:schemeClr val="bg1"/>
+                </a:solidFill>
+              </a:rPr>
+              <a:t>', '</a:t>
+            </a:r>
+            <a:r>
+              <a:rPr lang="fr-FR" dirty="0" err="1">
+                <a:solidFill>
+                  <a:schemeClr val="bg1"/>
+                </a:solidFill>
+              </a:rPr>
+              <a:t>rb</a:t>
+            </a:r>
+            <a:r>
+              <a:rPr lang="fr-FR" dirty="0">
+                <a:solidFill>
+                  <a:schemeClr val="bg1"/>
+                </a:solidFill>
+              </a:rPr>
+              <a:t>') as fichier:</a:t>
+            </a:r>
+          </a:p>
+          <a:p>
+            <a:r>
+              <a:rPr lang="fr-FR" dirty="0">
+                <a:solidFill>
+                  <a:schemeClr val="bg1"/>
+                </a:solidFill>
+              </a:rPr>
+              <a:t>...     mon_depickler = pickle.Unpickler(fichier)</a:t>
+            </a:r>
+          </a:p>
+          <a:p>
+            <a:r>
+              <a:rPr lang="fr-FR" dirty="0">
+                <a:solidFill>
+                  <a:schemeClr val="bg1"/>
+                </a:solidFill>
+              </a:rPr>
+              <a:t>...     score_recupere = </a:t>
+            </a:r>
+            <a:r>
+              <a:rPr lang="fr-FR" dirty="0" err="1">
+                <a:solidFill>
+                  <a:schemeClr val="bg1"/>
+                </a:solidFill>
+              </a:rPr>
+              <a:t>mon_depickler.load</a:t>
+            </a:r>
+            <a:r>
+              <a:rPr lang="fr-FR" dirty="0">
+                <a:solidFill>
+                  <a:schemeClr val="bg1"/>
+                </a:solidFill>
+              </a:rPr>
+              <a:t>()</a:t>
+            </a:r>
+          </a:p>
+        </p:txBody>
+      </p:sp>
+    </p:spTree>
+    <p:extLst>
+      <p:ext uri="{BB962C8B-B14F-4D97-AF65-F5344CB8AC3E}">
+        <p14:creationId xmlns:p14="http://schemas.microsoft.com/office/powerpoint/2010/main" val="4043584433"/>
+      </p:ext>
+    </p:extLst>
+  </p:cSld>
+  <p:clrMapOvr>
+    <a:masterClrMapping/>
+  </p:clrMapOvr>
+</p:sld>
+</file>
+
+<file path=ppt/slides/slide97.xml><?xml version="1.0" encoding="utf-8"?>
+<p:sld xmlns:a="http://schemas.openxmlformats.org/drawingml/2006/main" xmlns:r="http://schemas.openxmlformats.org/officeDocument/2006/relationships" xmlns:p="http://schemas.openxmlformats.org/presentationml/2006/main">
+  <p:cSld>
+    <p:spTree>
+      <p:nvGrpSpPr>
+        <p:cNvPr id="1" name=""/>
+        <p:cNvGrpSpPr/>
+        <p:nvPr/>
+      </p:nvGrpSpPr>
+      <p:grpSpPr>
+        <a:xfrm>
+          <a:off x="0" y="0"/>
+          <a:ext cx="0" cy="0"/>
+          <a:chOff x="0" y="0"/>
+          <a:chExt cx="0" cy="0"/>
+        </a:xfrm>
+      </p:grpSpPr>
+      <p:sp>
+        <p:nvSpPr>
+          <p:cNvPr id="3" name="Espace réservé du contenu 2">
+            <a:extLst>
+              <a:ext uri="{FF2B5EF4-FFF2-40B4-BE49-F238E27FC236}">
+                <a16:creationId xmlns:a16="http://schemas.microsoft.com/office/drawing/2014/main" id="{26019C14-248F-4937-B7A1-BB6BDCB8ED35}"/>
+              </a:ext>
+            </a:extLst>
+          </p:cNvPr>
+          <p:cNvSpPr>
+            <a:spLocks noGrp="1"/>
+          </p:cNvSpPr>
+          <p:nvPr>
+            <p:ph idx="1"/>
+          </p:nvPr>
+        </p:nvSpPr>
+        <p:spPr>
+          <a:xfrm>
+            <a:off x="1" y="0"/>
+            <a:ext cx="12191999" cy="6857999"/>
+          </a:xfrm>
+          <a:gradFill>
+            <a:gsLst>
+              <a:gs pos="0">
+                <a:schemeClr val="bg2">
+                  <a:lumMod val="90000"/>
+                </a:schemeClr>
+              </a:gs>
+              <a:gs pos="100000">
+                <a:schemeClr val="bg2">
+                  <a:lumMod val="25000"/>
+                </a:schemeClr>
+              </a:gs>
+            </a:gsLst>
+            <a:lin ang="5400000" scaled="1"/>
+          </a:gradFill>
+        </p:spPr>
+        <p:txBody>
+          <a:bodyPr/>
+          <a:lstStyle/>
+          <a:p>
+            <a:pPr marL="0" indent="0">
+              <a:buNone/>
+            </a:pPr>
+            <a:r>
+              <a:rPr lang="fr-FR" dirty="0"/>
+              <a:t>	</a:t>
+            </a:r>
+          </a:p>
+          <a:p>
+            <a:pPr marL="0" indent="0">
+              <a:buNone/>
+            </a:pPr>
+            <a:endParaRPr lang="fr-FR" dirty="0"/>
+          </a:p>
+          <a:p>
+            <a:pPr marL="0" indent="0">
+              <a:buNone/>
+            </a:pPr>
+            <a:endParaRPr lang="fr-FR" dirty="0"/>
+          </a:p>
+          <a:p>
+            <a:pPr marL="0" indent="0">
+              <a:buNone/>
+            </a:pPr>
+            <a:endParaRPr lang="fr-FR" sz="1400" dirty="0"/>
+          </a:p>
+          <a:p>
+            <a:pPr marL="0" indent="0">
+              <a:lnSpc>
+                <a:spcPct val="100000"/>
+              </a:lnSpc>
+              <a:buNone/>
+            </a:pPr>
+            <a:endParaRPr lang="fr-FR" sz="1400" b="1" dirty="0"/>
+          </a:p>
+        </p:txBody>
+      </p:sp>
+      <p:sp>
+        <p:nvSpPr>
+          <p:cNvPr id="2" name="Titre 1">
+            <a:extLst>
+              <a:ext uri="{FF2B5EF4-FFF2-40B4-BE49-F238E27FC236}">
+                <a16:creationId xmlns:a16="http://schemas.microsoft.com/office/drawing/2014/main" id="{C2DDB91C-04E9-41CA-9731-E7D1B6B6D47E}"/>
+              </a:ext>
+            </a:extLst>
+          </p:cNvPr>
+          <p:cNvSpPr>
+            <a:spLocks noGrp="1"/>
+          </p:cNvSpPr>
+          <p:nvPr>
+            <p:ph type="title"/>
+          </p:nvPr>
+        </p:nvSpPr>
+        <p:spPr>
+          <a:xfrm>
+            <a:off x="-266698" y="0"/>
+            <a:ext cx="12192000" cy="1325563"/>
+          </a:xfrm>
+        </p:spPr>
+        <p:txBody>
+          <a:bodyPr>
+            <a:noAutofit/>
+          </a:bodyPr>
+          <a:lstStyle/>
+          <a:p>
+            <a:pPr lvl="0" algn="ctr" fontAlgn="base">
+              <a:spcAft>
+                <a:spcPct val="0"/>
+              </a:spcAft>
+            </a:pPr>
+            <a:r>
+              <a:rPr lang="fr-FR" altLang="fr-FR" sz="6000" dirty="0">
+                <a:solidFill>
+                  <a:schemeClr val="accent5">
+                    <a:lumMod val="75000"/>
+                  </a:schemeClr>
+                </a:solidFill>
+              </a:rPr>
+              <a:t>Résumé</a:t>
+            </a:r>
+            <a:endParaRPr lang="fr-FR" altLang="fr-FR" sz="6000" b="1" dirty="0">
+              <a:solidFill>
+                <a:schemeClr val="accent5">
+                  <a:lumMod val="75000"/>
+                </a:schemeClr>
+              </a:solidFill>
+            </a:endParaRPr>
+          </a:p>
+        </p:txBody>
+      </p:sp>
+      <p:sp>
+        <p:nvSpPr>
+          <p:cNvPr id="4" name="ZoneTexte 3">
+            <a:extLst>
+              <a:ext uri="{FF2B5EF4-FFF2-40B4-BE49-F238E27FC236}">
+                <a16:creationId xmlns:a16="http://schemas.microsoft.com/office/drawing/2014/main" id="{318E8B91-EB38-4F32-897B-41BFDFA2D26D}"/>
+              </a:ext>
+            </a:extLst>
+          </p:cNvPr>
+          <p:cNvSpPr txBox="1"/>
+          <p:nvPr/>
+        </p:nvSpPr>
+        <p:spPr>
+          <a:xfrm>
+            <a:off x="209554" y="12012972"/>
+            <a:ext cx="11715748" cy="914400"/>
+          </a:xfrm>
+          <a:prstGeom prst="rect">
+            <a:avLst/>
+          </a:prstGeom>
+          <a:noFill/>
+        </p:spPr>
+        <p:txBody>
+          <a:bodyPr wrap="square" rtlCol="0">
+            <a:spAutoFit/>
+          </a:bodyPr>
+          <a:lstStyle/>
+          <a:p>
+            <a:endParaRPr lang="fr-FR" dirty="0"/>
+          </a:p>
+        </p:txBody>
+      </p:sp>
+      <p:sp>
+        <p:nvSpPr>
+          <p:cNvPr id="5" name="ZoneTexte 4">
+            <a:extLst>
+              <a:ext uri="{FF2B5EF4-FFF2-40B4-BE49-F238E27FC236}">
+                <a16:creationId xmlns:a16="http://schemas.microsoft.com/office/drawing/2014/main" id="{5ED24F53-74E8-4CB8-AE4D-1EC67A8AAC6F}"/>
+              </a:ext>
+            </a:extLst>
+          </p:cNvPr>
+          <p:cNvSpPr txBox="1"/>
+          <p:nvPr/>
+        </p:nvSpPr>
+        <p:spPr>
+          <a:xfrm>
+            <a:off x="209554" y="1604962"/>
+            <a:ext cx="11906246" cy="3416320"/>
+          </a:xfrm>
+          <a:prstGeom prst="rect">
+            <a:avLst/>
+          </a:prstGeom>
+          <a:noFill/>
+        </p:spPr>
+        <p:txBody>
+          <a:bodyPr wrap="square" rtlCol="0">
+            <a:spAutoFit/>
+          </a:bodyPr>
+          <a:lstStyle/>
+          <a:p>
+            <a:r>
+              <a:rPr lang="fr-FR" b="1" dirty="0"/>
+              <a:t>En résumé</a:t>
+            </a:r>
+          </a:p>
+          <a:p>
+            <a:endParaRPr lang="fr-FR" b="1" dirty="0"/>
+          </a:p>
+          <a:p>
+            <a:r>
+              <a:rPr lang="fr-FR" b="1" dirty="0"/>
+              <a:t>    On peut ouvrir un fichier en utilisant la fonction open prenant en paramètre le chemin vers le fichier et le mode d'ouverture.</a:t>
+            </a:r>
+          </a:p>
+          <a:p>
+            <a:endParaRPr lang="fr-FR" b="1" dirty="0"/>
+          </a:p>
+          <a:p>
+            <a:r>
+              <a:rPr lang="fr-FR" b="1" dirty="0"/>
+              <a:t>    On peut lire dans un fichier en utilisant la méthode </a:t>
+            </a:r>
+            <a:r>
+              <a:rPr lang="fr-FR" b="1" dirty="0" err="1"/>
+              <a:t>read</a:t>
+            </a:r>
+            <a:r>
+              <a:rPr lang="fr-FR" b="1" dirty="0"/>
+              <a:t>.</a:t>
+            </a:r>
+          </a:p>
+          <a:p>
+            <a:endParaRPr lang="fr-FR" b="1" dirty="0"/>
+          </a:p>
+          <a:p>
+            <a:r>
+              <a:rPr lang="fr-FR" b="1" dirty="0"/>
+              <a:t>    On peut écrire dans un fichier en utilisant la méthode </a:t>
+            </a:r>
+            <a:r>
+              <a:rPr lang="fr-FR" b="1" dirty="0" err="1"/>
+              <a:t>write</a:t>
+            </a:r>
+            <a:r>
+              <a:rPr lang="fr-FR" b="1" dirty="0"/>
+              <a:t>.</a:t>
+            </a:r>
+          </a:p>
+          <a:p>
+            <a:endParaRPr lang="fr-FR" b="1" dirty="0"/>
+          </a:p>
+          <a:p>
+            <a:r>
+              <a:rPr lang="fr-FR" b="1" dirty="0"/>
+              <a:t>    Un fichier doit être refermé après usage en utilisant la méthode close.</a:t>
+            </a:r>
+          </a:p>
+          <a:p>
+            <a:endParaRPr lang="fr-FR" b="1" dirty="0"/>
+          </a:p>
+          <a:p>
+            <a:r>
+              <a:rPr lang="fr-FR" b="1" dirty="0"/>
+              <a:t>    </a:t>
+            </a:r>
+            <a:r>
+              <a:rPr lang="fr-FR" b="1"/>
+              <a:t>Le module pickle est </a:t>
+            </a:r>
+            <a:r>
+              <a:rPr lang="fr-FR" b="1" dirty="0"/>
+              <a:t>utilisé pour enregistrer des objets Python dans des fichiers et les recharger ensuite.</a:t>
+            </a:r>
+            <a:endParaRPr lang="fr-FR" dirty="0"/>
+          </a:p>
+        </p:txBody>
+      </p:sp>
+    </p:spTree>
+    <p:extLst>
+      <p:ext uri="{BB962C8B-B14F-4D97-AF65-F5344CB8AC3E}">
+        <p14:creationId xmlns:p14="http://schemas.microsoft.com/office/powerpoint/2010/main" val="1004206502"/>
+      </p:ext>
+    </p:extLst>
+  </p:cSld>
+  <p:clrMapOvr>
+    <a:masterClrMapping/>
+  </p:clrMapOvr>
+</p:sld>
+</file>
+
 <file path=ppt/theme/theme1.xml><?xml version="1.0" encoding="utf-8"?>
 <a:theme xmlns:a="http://schemas.openxmlformats.org/drawingml/2006/main" name="Thème Office">
   <a:themeElements>

</xml_diff>